<commit_message>
Completed solution block diagram
</commit_message>
<xml_diff>
--- a/DemoWebAppWithCiCd/docs/cicd.pptx
+++ b/DemoWebAppWithCiCd/docs/cicd.pptx
@@ -8,6 +8,7 @@
     <p:sldId id="256" r:id="rId2"/>
     <p:sldId id="257" r:id="rId3"/>
     <p:sldId id="258" r:id="rId4"/>
+    <p:sldId id="259" r:id="rId5"/>
   </p:sldIdLst>
   <p:sldSz cx="12192000" cy="6858000"/>
   <p:notesSz cx="6858000" cy="9144000"/>
@@ -106,6 +107,11 @@
       </a:defRPr>
     </a:lvl9pPr>
   </p:defaultTextStyle>
+  <p:extLst>
+    <p:ext uri="{EFAFB233-063F-42B5-8137-9DF3F51BA10A}">
+      <p15:sldGuideLst xmlns:p15="http://schemas.microsoft.com/office/powerpoint/2012/main"/>
+    </p:ext>
+  </p:extLst>
 </p:presentation>
 </file>
 
@@ -258,7 +264,7 @@
           <a:p>
             <a:fld id="{BF07A079-B31B-4090-91C5-D173FD87E491}" type="datetimeFigureOut">
               <a:rPr lang="en-GB" smtClean="0"/>
-              <a:t>14/02/2022</a:t>
+              <a:t>15/02/2022</a:t>
             </a:fld>
             <a:endParaRPr lang="en-GB"/>
           </a:p>
@@ -458,7 +464,7 @@
           <a:p>
             <a:fld id="{BF07A079-B31B-4090-91C5-D173FD87E491}" type="datetimeFigureOut">
               <a:rPr lang="en-GB" smtClean="0"/>
-              <a:t>14/02/2022</a:t>
+              <a:t>15/02/2022</a:t>
             </a:fld>
             <a:endParaRPr lang="en-GB"/>
           </a:p>
@@ -668,7 +674,7 @@
           <a:p>
             <a:fld id="{BF07A079-B31B-4090-91C5-D173FD87E491}" type="datetimeFigureOut">
               <a:rPr lang="en-GB" smtClean="0"/>
-              <a:t>14/02/2022</a:t>
+              <a:t>15/02/2022</a:t>
             </a:fld>
             <a:endParaRPr lang="en-GB"/>
           </a:p>
@@ -868,7 +874,7 @@
           <a:p>
             <a:fld id="{BF07A079-B31B-4090-91C5-D173FD87E491}" type="datetimeFigureOut">
               <a:rPr lang="en-GB" smtClean="0"/>
-              <a:t>14/02/2022</a:t>
+              <a:t>15/02/2022</a:t>
             </a:fld>
             <a:endParaRPr lang="en-GB"/>
           </a:p>
@@ -1144,7 +1150,7 @@
           <a:p>
             <a:fld id="{BF07A079-B31B-4090-91C5-D173FD87E491}" type="datetimeFigureOut">
               <a:rPr lang="en-GB" smtClean="0"/>
-              <a:t>14/02/2022</a:t>
+              <a:t>15/02/2022</a:t>
             </a:fld>
             <a:endParaRPr lang="en-GB"/>
           </a:p>
@@ -1412,7 +1418,7 @@
           <a:p>
             <a:fld id="{BF07A079-B31B-4090-91C5-D173FD87E491}" type="datetimeFigureOut">
               <a:rPr lang="en-GB" smtClean="0"/>
-              <a:t>14/02/2022</a:t>
+              <a:t>15/02/2022</a:t>
             </a:fld>
             <a:endParaRPr lang="en-GB"/>
           </a:p>
@@ -1827,7 +1833,7 @@
           <a:p>
             <a:fld id="{BF07A079-B31B-4090-91C5-D173FD87E491}" type="datetimeFigureOut">
               <a:rPr lang="en-GB" smtClean="0"/>
-              <a:t>14/02/2022</a:t>
+              <a:t>15/02/2022</a:t>
             </a:fld>
             <a:endParaRPr lang="en-GB"/>
           </a:p>
@@ -1969,7 +1975,7 @@
           <a:p>
             <a:fld id="{BF07A079-B31B-4090-91C5-D173FD87E491}" type="datetimeFigureOut">
               <a:rPr lang="en-GB" smtClean="0"/>
-              <a:t>14/02/2022</a:t>
+              <a:t>15/02/2022</a:t>
             </a:fld>
             <a:endParaRPr lang="en-GB"/>
           </a:p>
@@ -2082,7 +2088,7 @@
           <a:p>
             <a:fld id="{BF07A079-B31B-4090-91C5-D173FD87E491}" type="datetimeFigureOut">
               <a:rPr lang="en-GB" smtClean="0"/>
-              <a:t>14/02/2022</a:t>
+              <a:t>15/02/2022</a:t>
             </a:fld>
             <a:endParaRPr lang="en-GB"/>
           </a:p>
@@ -2395,7 +2401,7 @@
           <a:p>
             <a:fld id="{BF07A079-B31B-4090-91C5-D173FD87E491}" type="datetimeFigureOut">
               <a:rPr lang="en-GB" smtClean="0"/>
-              <a:t>14/02/2022</a:t>
+              <a:t>15/02/2022</a:t>
             </a:fld>
             <a:endParaRPr lang="en-GB"/>
           </a:p>
@@ -2684,7 +2690,7 @@
           <a:p>
             <a:fld id="{BF07A079-B31B-4090-91C5-D173FD87E491}" type="datetimeFigureOut">
               <a:rPr lang="en-GB" smtClean="0"/>
-              <a:t>14/02/2022</a:t>
+              <a:t>15/02/2022</a:t>
             </a:fld>
             <a:endParaRPr lang="en-GB"/>
           </a:p>
@@ -2927,7 +2933,7 @@
           <a:p>
             <a:fld id="{BF07A079-B31B-4090-91C5-D173FD87E491}" type="datetimeFigureOut">
               <a:rPr lang="en-GB" smtClean="0"/>
-              <a:t>14/02/2022</a:t>
+              <a:t>15/02/2022</a:t>
             </a:fld>
             <a:endParaRPr lang="en-GB"/>
           </a:p>
@@ -4034,171 +4040,30 @@
       </p:grpSpPr>
       <p:sp>
         <p:nvSpPr>
-          <p:cNvPr id="2" name="TextBox 1">
-            <a:extLst>
-              <a:ext uri="{FF2B5EF4-FFF2-40B4-BE49-F238E27FC236}">
-                <a16:creationId xmlns:a16="http://schemas.microsoft.com/office/drawing/2014/main" id="{8179EABB-F219-4378-9CE1-B4B53683E9C5}"/>
-              </a:ext>
-            </a:extLst>
-          </p:cNvPr>
-          <p:cNvSpPr txBox="1"/>
+          <p:cNvPr id="14" name="Rectangle 13">
+            <a:extLst>
+              <a:ext uri="{FF2B5EF4-FFF2-40B4-BE49-F238E27FC236}">
+                <a16:creationId xmlns:a16="http://schemas.microsoft.com/office/drawing/2014/main" id="{C7B666DE-FAFF-41B3-BF2B-EF50F3DDE338}"/>
+              </a:ext>
+            </a:extLst>
+          </p:cNvPr>
+          <p:cNvSpPr/>
           <p:nvPr/>
         </p:nvSpPr>
         <p:spPr>
           <a:xfrm>
-            <a:off x="3189601" y="2289511"/>
-            <a:ext cx="6006517" cy="369332"/>
+            <a:off x="671119" y="307742"/>
+            <a:ext cx="10763075" cy="819316"/>
           </a:xfrm>
           <a:prstGeom prst="rect">
             <a:avLst/>
           </a:prstGeom>
           <a:solidFill>
-            <a:schemeClr val="accent6">
-              <a:lumMod val="20000"/>
-              <a:lumOff val="80000"/>
+            <a:schemeClr val="bg1">
+              <a:lumMod val="95000"/>
+              <a:alpha val="20000"/>
             </a:schemeClr>
           </a:solidFill>
-        </p:spPr>
-        <p:txBody>
-          <a:bodyPr wrap="square" rtlCol="0">
-            <a:spAutoFit/>
-          </a:bodyPr>
-          <a:lstStyle/>
-          <a:p>
-            <a:pPr algn="ctr"/>
-            <a:r>
-              <a:rPr lang="en-GB" dirty="0"/>
-              <a:t>Continuous integration (</a:t>
-            </a:r>
-            <a:r>
-              <a:rPr lang="en-GB" b="1" dirty="0"/>
-              <a:t>build, unit tests</a:t>
-            </a:r>
-            <a:r>
-              <a:rPr lang="en-GB" dirty="0"/>
-              <a:t>)</a:t>
-            </a:r>
-          </a:p>
-        </p:txBody>
-      </p:sp>
-      <p:sp>
-        <p:nvSpPr>
-          <p:cNvPr id="4" name="TextBox 3">
-            <a:extLst>
-              <a:ext uri="{FF2B5EF4-FFF2-40B4-BE49-F238E27FC236}">
-                <a16:creationId xmlns:a16="http://schemas.microsoft.com/office/drawing/2014/main" id="{E8D0CECE-5857-4A7A-806D-B6C67333A343}"/>
-              </a:ext>
-            </a:extLst>
-          </p:cNvPr>
-          <p:cNvSpPr txBox="1"/>
-          <p:nvPr/>
-        </p:nvSpPr>
-        <p:spPr>
-          <a:xfrm>
-            <a:off x="1035698" y="559837"/>
-            <a:ext cx="3582955" cy="369332"/>
-          </a:xfrm>
-          <a:prstGeom prst="rect">
-            <a:avLst/>
-          </a:prstGeom>
-          <a:solidFill>
-            <a:schemeClr val="tx2">
-              <a:lumMod val="20000"/>
-              <a:lumOff val="80000"/>
-            </a:schemeClr>
-          </a:solidFill>
-        </p:spPr>
-        <p:txBody>
-          <a:bodyPr wrap="square" rtlCol="0">
-            <a:spAutoFit/>
-          </a:bodyPr>
-          <a:lstStyle/>
-          <a:p>
-            <a:pPr algn="ctr"/>
-            <a:r>
-              <a:rPr lang="en-GB" dirty="0"/>
-              <a:t>Back end code (</a:t>
-            </a:r>
-            <a:r>
-              <a:rPr lang="en-GB" b="1" dirty="0"/>
-              <a:t>C#, REST</a:t>
-            </a:r>
-            <a:r>
-              <a:rPr lang="en-GB" dirty="0"/>
-              <a:t>)</a:t>
-            </a:r>
-          </a:p>
-        </p:txBody>
-      </p:sp>
-      <p:sp>
-        <p:nvSpPr>
-          <p:cNvPr id="5" name="TextBox 4">
-            <a:extLst>
-              <a:ext uri="{FF2B5EF4-FFF2-40B4-BE49-F238E27FC236}">
-                <a16:creationId xmlns:a16="http://schemas.microsoft.com/office/drawing/2014/main" id="{D2A08D92-8EF8-4144-8FA8-99FDBCC23008}"/>
-              </a:ext>
-            </a:extLst>
-          </p:cNvPr>
-          <p:cNvSpPr txBox="1"/>
-          <p:nvPr/>
-        </p:nvSpPr>
-        <p:spPr>
-          <a:xfrm>
-            <a:off x="7573347" y="559837"/>
-            <a:ext cx="3582955" cy="369332"/>
-          </a:xfrm>
-          <a:prstGeom prst="rect">
-            <a:avLst/>
-          </a:prstGeom>
-          <a:solidFill>
-            <a:schemeClr val="tx2">
-              <a:lumMod val="20000"/>
-              <a:lumOff val="80000"/>
-            </a:schemeClr>
-          </a:solidFill>
-        </p:spPr>
-        <p:txBody>
-          <a:bodyPr wrap="square" rtlCol="0">
-            <a:spAutoFit/>
-          </a:bodyPr>
-          <a:lstStyle/>
-          <a:p>
-            <a:pPr algn="ctr"/>
-            <a:r>
-              <a:rPr lang="en-GB" dirty="0"/>
-              <a:t>Front end code (</a:t>
-            </a:r>
-            <a:r>
-              <a:rPr lang="en-GB" b="1" dirty="0"/>
-              <a:t>HTML, JS</a:t>
-            </a:r>
-            <a:r>
-              <a:rPr lang="en-GB" dirty="0"/>
-              <a:t>)</a:t>
-            </a:r>
-          </a:p>
-        </p:txBody>
-      </p:sp>
-      <p:sp>
-        <p:nvSpPr>
-          <p:cNvPr id="6" name="Arrow: Down 5">
-            <a:extLst>
-              <a:ext uri="{FF2B5EF4-FFF2-40B4-BE49-F238E27FC236}">
-                <a16:creationId xmlns:a16="http://schemas.microsoft.com/office/drawing/2014/main" id="{24AF1921-80B0-4A54-840C-E268C09BED05}"/>
-              </a:ext>
-            </a:extLst>
-          </p:cNvPr>
-          <p:cNvSpPr/>
-          <p:nvPr/>
-        </p:nvSpPr>
-        <p:spPr>
-          <a:xfrm>
-            <a:off x="3189601" y="1268963"/>
-            <a:ext cx="384023" cy="727788"/>
-          </a:xfrm>
-          <a:prstGeom prst="downArrow">
-            <a:avLst/>
-          </a:prstGeom>
         </p:spPr>
         <p:style>
           <a:lnRef idx="2">
@@ -4227,10 +4092,157 @@
       </p:sp>
       <p:sp>
         <p:nvSpPr>
-          <p:cNvPr id="7" name="Arrow: Down 6">
-            <a:extLst>
-              <a:ext uri="{FF2B5EF4-FFF2-40B4-BE49-F238E27FC236}">
-                <a16:creationId xmlns:a16="http://schemas.microsoft.com/office/drawing/2014/main" id="{74E3919B-2A95-484A-B8A6-9B131AD96752}"/>
+          <p:cNvPr id="2" name="TextBox 1">
+            <a:extLst>
+              <a:ext uri="{FF2B5EF4-FFF2-40B4-BE49-F238E27FC236}">
+                <a16:creationId xmlns:a16="http://schemas.microsoft.com/office/drawing/2014/main" id="{8179EABB-F219-4378-9CE1-B4B53683E9C5}"/>
+              </a:ext>
+            </a:extLst>
+          </p:cNvPr>
+          <p:cNvSpPr txBox="1"/>
+          <p:nvPr/>
+        </p:nvSpPr>
+        <p:spPr>
+          <a:xfrm>
+            <a:off x="3189601" y="2289511"/>
+            <a:ext cx="6006517" cy="369332"/>
+          </a:xfrm>
+          <a:prstGeom prst="rect">
+            <a:avLst/>
+          </a:prstGeom>
+          <a:solidFill>
+            <a:schemeClr val="accent6">
+              <a:lumMod val="20000"/>
+              <a:lumOff val="80000"/>
+            </a:schemeClr>
+          </a:solidFill>
+        </p:spPr>
+        <p:txBody>
+          <a:bodyPr wrap="square" rtlCol="0">
+            <a:spAutoFit/>
+          </a:bodyPr>
+          <a:lstStyle/>
+          <a:p>
+            <a:pPr algn="ctr"/>
+            <a:r>
+              <a:rPr lang="en-GB" dirty="0"/>
+              <a:t>Continuous integration (</a:t>
+            </a:r>
+            <a:r>
+              <a:rPr lang="en-GB" b="1" dirty="0"/>
+              <a:t>build, unit tests</a:t>
+            </a:r>
+            <a:r>
+              <a:rPr lang="en-GB" dirty="0"/>
+              <a:t>)</a:t>
+            </a:r>
+          </a:p>
+        </p:txBody>
+      </p:sp>
+      <p:sp>
+        <p:nvSpPr>
+          <p:cNvPr id="4" name="TextBox 3">
+            <a:extLst>
+              <a:ext uri="{FF2B5EF4-FFF2-40B4-BE49-F238E27FC236}">
+                <a16:creationId xmlns:a16="http://schemas.microsoft.com/office/drawing/2014/main" id="{E8D0CECE-5857-4A7A-806D-B6C67333A343}"/>
+              </a:ext>
+            </a:extLst>
+          </p:cNvPr>
+          <p:cNvSpPr txBox="1"/>
+          <p:nvPr/>
+        </p:nvSpPr>
+        <p:spPr>
+          <a:xfrm>
+            <a:off x="1035698" y="559837"/>
+            <a:ext cx="3582955" cy="369332"/>
+          </a:xfrm>
+          <a:prstGeom prst="rect">
+            <a:avLst/>
+          </a:prstGeom>
+          <a:solidFill>
+            <a:schemeClr val="tx2">
+              <a:lumMod val="20000"/>
+              <a:lumOff val="80000"/>
+            </a:schemeClr>
+          </a:solidFill>
+        </p:spPr>
+        <p:txBody>
+          <a:bodyPr wrap="square" rtlCol="0">
+            <a:spAutoFit/>
+          </a:bodyPr>
+          <a:lstStyle/>
+          <a:p>
+            <a:pPr algn="ctr"/>
+            <a:r>
+              <a:rPr lang="en-GB" dirty="0"/>
+              <a:t>Back end code (</a:t>
+            </a:r>
+            <a:r>
+              <a:rPr lang="en-GB" b="1" dirty="0"/>
+              <a:t>C#, REST</a:t>
+            </a:r>
+            <a:r>
+              <a:rPr lang="en-GB" dirty="0"/>
+              <a:t>)</a:t>
+            </a:r>
+          </a:p>
+        </p:txBody>
+      </p:sp>
+      <p:sp>
+        <p:nvSpPr>
+          <p:cNvPr id="5" name="TextBox 4">
+            <a:extLst>
+              <a:ext uri="{FF2B5EF4-FFF2-40B4-BE49-F238E27FC236}">
+                <a16:creationId xmlns:a16="http://schemas.microsoft.com/office/drawing/2014/main" id="{D2A08D92-8EF8-4144-8FA8-99FDBCC23008}"/>
+              </a:ext>
+            </a:extLst>
+          </p:cNvPr>
+          <p:cNvSpPr txBox="1"/>
+          <p:nvPr/>
+        </p:nvSpPr>
+        <p:spPr>
+          <a:xfrm>
+            <a:off x="7573347" y="559837"/>
+            <a:ext cx="3582955" cy="369332"/>
+          </a:xfrm>
+          <a:prstGeom prst="rect">
+            <a:avLst/>
+          </a:prstGeom>
+          <a:solidFill>
+            <a:schemeClr val="tx2">
+              <a:lumMod val="20000"/>
+              <a:lumOff val="80000"/>
+            </a:schemeClr>
+          </a:solidFill>
+        </p:spPr>
+        <p:txBody>
+          <a:bodyPr wrap="square" rtlCol="0">
+            <a:spAutoFit/>
+          </a:bodyPr>
+          <a:lstStyle/>
+          <a:p>
+            <a:pPr algn="ctr"/>
+            <a:r>
+              <a:rPr lang="en-GB" dirty="0"/>
+              <a:t>Front end code (</a:t>
+            </a:r>
+            <a:r>
+              <a:rPr lang="en-GB" b="1" dirty="0"/>
+              <a:t>HTML, JS</a:t>
+            </a:r>
+            <a:r>
+              <a:rPr lang="en-GB" dirty="0"/>
+              <a:t>)</a:t>
+            </a:r>
+          </a:p>
+        </p:txBody>
+      </p:sp>
+      <p:sp>
+        <p:nvSpPr>
+          <p:cNvPr id="6" name="Arrow: Down 5">
+            <a:extLst>
+              <a:ext uri="{FF2B5EF4-FFF2-40B4-BE49-F238E27FC236}">
+                <a16:creationId xmlns:a16="http://schemas.microsoft.com/office/drawing/2014/main" id="{24AF1921-80B0-4A54-840C-E268C09BED05}"/>
               </a:ext>
             </a:extLst>
           </p:cNvPr>
@@ -4239,7 +4251,7 @@
         </p:nvSpPr>
         <p:spPr>
           <a:xfrm>
-            <a:off x="8812095" y="1245446"/>
+            <a:off x="3189601" y="1268963"/>
             <a:ext cx="384023" cy="727788"/>
           </a:xfrm>
           <a:prstGeom prst="downArrow">
@@ -4273,10 +4285,10 @@
       </p:sp>
       <p:sp>
         <p:nvSpPr>
-          <p:cNvPr id="8" name="Arrow: Down 7">
-            <a:extLst>
-              <a:ext uri="{FF2B5EF4-FFF2-40B4-BE49-F238E27FC236}">
-                <a16:creationId xmlns:a16="http://schemas.microsoft.com/office/drawing/2014/main" id="{AE48AC1C-DAC4-4AB3-A904-CE923FF717E0}"/>
+          <p:cNvPr id="7" name="Arrow: Down 6">
+            <a:extLst>
+              <a:ext uri="{FF2B5EF4-FFF2-40B4-BE49-F238E27FC236}">
+                <a16:creationId xmlns:a16="http://schemas.microsoft.com/office/drawing/2014/main" id="{74E3919B-2A95-484A-B8A6-9B131AD96752}"/>
               </a:ext>
             </a:extLst>
           </p:cNvPr>
@@ -4285,7 +4297,7 @@
         </p:nvSpPr>
         <p:spPr>
           <a:xfrm>
-            <a:off x="5903988" y="2848962"/>
+            <a:off x="8812095" y="1245446"/>
             <a:ext cx="384023" cy="727788"/>
           </a:xfrm>
           <a:prstGeom prst="downArrow">
@@ -4319,145 +4331,10 @@
       </p:sp>
       <p:sp>
         <p:nvSpPr>
-          <p:cNvPr id="9" name="TextBox 8">
-            <a:extLst>
-              <a:ext uri="{FF2B5EF4-FFF2-40B4-BE49-F238E27FC236}">
-                <a16:creationId xmlns:a16="http://schemas.microsoft.com/office/drawing/2014/main" id="{0CFC987A-DE8C-417D-B4A2-ED49601AD08C}"/>
-              </a:ext>
-            </a:extLst>
-          </p:cNvPr>
-          <p:cNvSpPr txBox="1"/>
-          <p:nvPr/>
-        </p:nvSpPr>
-        <p:spPr>
-          <a:xfrm>
-            <a:off x="3189601" y="3638193"/>
-            <a:ext cx="6006517" cy="369332"/>
-          </a:xfrm>
-          <a:prstGeom prst="rect">
-            <a:avLst/>
-          </a:prstGeom>
-          <a:solidFill>
-            <a:schemeClr val="accent4">
-              <a:lumMod val="40000"/>
-              <a:lumOff val="60000"/>
-            </a:schemeClr>
-          </a:solidFill>
-        </p:spPr>
-        <p:txBody>
-          <a:bodyPr wrap="square" rtlCol="0">
-            <a:spAutoFit/>
-          </a:bodyPr>
-          <a:lstStyle/>
-          <a:p>
-            <a:pPr algn="ctr"/>
-            <a:r>
-              <a:rPr lang="en-GB" dirty="0"/>
-              <a:t>Continuous deployment </a:t>
-            </a:r>
-            <a:r>
-              <a:rPr lang="en-GB" b="1" dirty="0"/>
-              <a:t>(DEV)</a:t>
-            </a:r>
-          </a:p>
-        </p:txBody>
-      </p:sp>
-      <p:sp>
-        <p:nvSpPr>
-          <p:cNvPr id="10" name="TextBox 9">
-            <a:extLst>
-              <a:ext uri="{FF2B5EF4-FFF2-40B4-BE49-F238E27FC236}">
-                <a16:creationId xmlns:a16="http://schemas.microsoft.com/office/drawing/2014/main" id="{59AC8242-AD08-4053-AE9B-2FF295411A7B}"/>
-              </a:ext>
-            </a:extLst>
-          </p:cNvPr>
-          <p:cNvSpPr txBox="1"/>
-          <p:nvPr/>
-        </p:nvSpPr>
-        <p:spPr>
-          <a:xfrm>
-            <a:off x="3189601" y="4968746"/>
-            <a:ext cx="6006517" cy="369332"/>
-          </a:xfrm>
-          <a:prstGeom prst="rect">
-            <a:avLst/>
-          </a:prstGeom>
-          <a:solidFill>
-            <a:schemeClr val="accent4">
-              <a:lumMod val="40000"/>
-              <a:lumOff val="60000"/>
-            </a:schemeClr>
-          </a:solidFill>
-        </p:spPr>
-        <p:txBody>
-          <a:bodyPr wrap="square" rtlCol="0">
-            <a:spAutoFit/>
-          </a:bodyPr>
-          <a:lstStyle/>
-          <a:p>
-            <a:pPr algn="ctr"/>
-            <a:r>
-              <a:rPr lang="en-GB" dirty="0"/>
-              <a:t>Continuous deployment </a:t>
-            </a:r>
-            <a:r>
-              <a:rPr lang="en-GB" b="1" dirty="0"/>
-              <a:t>(UAT)</a:t>
-            </a:r>
-          </a:p>
-        </p:txBody>
-      </p:sp>
-      <p:sp>
-        <p:nvSpPr>
-          <p:cNvPr id="11" name="TextBox 10">
-            <a:extLst>
-              <a:ext uri="{FF2B5EF4-FFF2-40B4-BE49-F238E27FC236}">
-                <a16:creationId xmlns:a16="http://schemas.microsoft.com/office/drawing/2014/main" id="{1DD188F4-6A53-4EB1-88D4-58A9DCDE7CEE}"/>
-              </a:ext>
-            </a:extLst>
-          </p:cNvPr>
-          <p:cNvSpPr txBox="1"/>
-          <p:nvPr/>
-        </p:nvSpPr>
-        <p:spPr>
-          <a:xfrm>
-            <a:off x="3189601" y="6308620"/>
-            <a:ext cx="6006517" cy="369332"/>
-          </a:xfrm>
-          <a:prstGeom prst="rect">
-            <a:avLst/>
-          </a:prstGeom>
-          <a:solidFill>
-            <a:schemeClr val="accent4">
-              <a:lumMod val="40000"/>
-              <a:lumOff val="60000"/>
-            </a:schemeClr>
-          </a:solidFill>
-        </p:spPr>
-        <p:txBody>
-          <a:bodyPr wrap="square" rtlCol="0">
-            <a:spAutoFit/>
-          </a:bodyPr>
-          <a:lstStyle/>
-          <a:p>
-            <a:pPr algn="ctr"/>
-            <a:r>
-              <a:rPr lang="en-GB" dirty="0"/>
-              <a:t>Continuous deployment </a:t>
-            </a:r>
-            <a:r>
-              <a:rPr lang="en-GB" b="1" dirty="0"/>
-              <a:t>(PROD)</a:t>
-            </a:r>
-          </a:p>
-        </p:txBody>
-      </p:sp>
-      <p:sp>
-        <p:nvSpPr>
-          <p:cNvPr id="12" name="Arrow: Down 11">
-            <a:extLst>
-              <a:ext uri="{FF2B5EF4-FFF2-40B4-BE49-F238E27FC236}">
-                <a16:creationId xmlns:a16="http://schemas.microsoft.com/office/drawing/2014/main" id="{04585BD0-4BF9-4B45-B6A4-7BFD9784CF31}"/>
+          <p:cNvPr id="8" name="Arrow: Down 7">
+            <a:extLst>
+              <a:ext uri="{FF2B5EF4-FFF2-40B4-BE49-F238E27FC236}">
+                <a16:creationId xmlns:a16="http://schemas.microsoft.com/office/drawing/2014/main" id="{AE48AC1C-DAC4-4AB3-A904-CE923FF717E0}"/>
               </a:ext>
             </a:extLst>
           </p:cNvPr>
@@ -4466,7 +4343,7 @@
         </p:nvSpPr>
         <p:spPr>
           <a:xfrm>
-            <a:off x="5903988" y="4134281"/>
+            <a:off x="5903988" y="2848962"/>
             <a:ext cx="384023" cy="727788"/>
           </a:xfrm>
           <a:prstGeom prst="downArrow">
@@ -4500,10 +4377,145 @@
       </p:sp>
       <p:sp>
         <p:nvSpPr>
-          <p:cNvPr id="13" name="Arrow: Down 12">
-            <a:extLst>
-              <a:ext uri="{FF2B5EF4-FFF2-40B4-BE49-F238E27FC236}">
-                <a16:creationId xmlns:a16="http://schemas.microsoft.com/office/drawing/2014/main" id="{2A3A0D28-12E2-44F9-AD0A-B8F0179F0290}"/>
+          <p:cNvPr id="9" name="TextBox 8">
+            <a:extLst>
+              <a:ext uri="{FF2B5EF4-FFF2-40B4-BE49-F238E27FC236}">
+                <a16:creationId xmlns:a16="http://schemas.microsoft.com/office/drawing/2014/main" id="{0CFC987A-DE8C-417D-B4A2-ED49601AD08C}"/>
+              </a:ext>
+            </a:extLst>
+          </p:cNvPr>
+          <p:cNvSpPr txBox="1"/>
+          <p:nvPr/>
+        </p:nvSpPr>
+        <p:spPr>
+          <a:xfrm>
+            <a:off x="3189601" y="3638193"/>
+            <a:ext cx="6006517" cy="369332"/>
+          </a:xfrm>
+          <a:prstGeom prst="rect">
+            <a:avLst/>
+          </a:prstGeom>
+          <a:solidFill>
+            <a:schemeClr val="accent4">
+              <a:lumMod val="40000"/>
+              <a:lumOff val="60000"/>
+            </a:schemeClr>
+          </a:solidFill>
+        </p:spPr>
+        <p:txBody>
+          <a:bodyPr wrap="square" rtlCol="0">
+            <a:spAutoFit/>
+          </a:bodyPr>
+          <a:lstStyle/>
+          <a:p>
+            <a:pPr algn="ctr"/>
+            <a:r>
+              <a:rPr lang="en-GB" dirty="0"/>
+              <a:t>Continuous deployment </a:t>
+            </a:r>
+            <a:r>
+              <a:rPr lang="en-GB" b="1" dirty="0"/>
+              <a:t>(DEV)</a:t>
+            </a:r>
+          </a:p>
+        </p:txBody>
+      </p:sp>
+      <p:sp>
+        <p:nvSpPr>
+          <p:cNvPr id="10" name="TextBox 9">
+            <a:extLst>
+              <a:ext uri="{FF2B5EF4-FFF2-40B4-BE49-F238E27FC236}">
+                <a16:creationId xmlns:a16="http://schemas.microsoft.com/office/drawing/2014/main" id="{59AC8242-AD08-4053-AE9B-2FF295411A7B}"/>
+              </a:ext>
+            </a:extLst>
+          </p:cNvPr>
+          <p:cNvSpPr txBox="1"/>
+          <p:nvPr/>
+        </p:nvSpPr>
+        <p:spPr>
+          <a:xfrm>
+            <a:off x="3189601" y="4968746"/>
+            <a:ext cx="6006517" cy="369332"/>
+          </a:xfrm>
+          <a:prstGeom prst="rect">
+            <a:avLst/>
+          </a:prstGeom>
+          <a:solidFill>
+            <a:schemeClr val="accent4">
+              <a:lumMod val="40000"/>
+              <a:lumOff val="60000"/>
+            </a:schemeClr>
+          </a:solidFill>
+        </p:spPr>
+        <p:txBody>
+          <a:bodyPr wrap="square" rtlCol="0">
+            <a:spAutoFit/>
+          </a:bodyPr>
+          <a:lstStyle/>
+          <a:p>
+            <a:pPr algn="ctr"/>
+            <a:r>
+              <a:rPr lang="en-GB" dirty="0"/>
+              <a:t>Continuous deployment </a:t>
+            </a:r>
+            <a:r>
+              <a:rPr lang="en-GB" b="1" dirty="0"/>
+              <a:t>(UAT)</a:t>
+            </a:r>
+          </a:p>
+        </p:txBody>
+      </p:sp>
+      <p:sp>
+        <p:nvSpPr>
+          <p:cNvPr id="11" name="TextBox 10">
+            <a:extLst>
+              <a:ext uri="{FF2B5EF4-FFF2-40B4-BE49-F238E27FC236}">
+                <a16:creationId xmlns:a16="http://schemas.microsoft.com/office/drawing/2014/main" id="{1DD188F4-6A53-4EB1-88D4-58A9DCDE7CEE}"/>
+              </a:ext>
+            </a:extLst>
+          </p:cNvPr>
+          <p:cNvSpPr txBox="1"/>
+          <p:nvPr/>
+        </p:nvSpPr>
+        <p:spPr>
+          <a:xfrm>
+            <a:off x="3189601" y="6308620"/>
+            <a:ext cx="6006517" cy="369332"/>
+          </a:xfrm>
+          <a:prstGeom prst="rect">
+            <a:avLst/>
+          </a:prstGeom>
+          <a:solidFill>
+            <a:schemeClr val="accent4">
+              <a:lumMod val="40000"/>
+              <a:lumOff val="60000"/>
+            </a:schemeClr>
+          </a:solidFill>
+        </p:spPr>
+        <p:txBody>
+          <a:bodyPr wrap="square" rtlCol="0">
+            <a:spAutoFit/>
+          </a:bodyPr>
+          <a:lstStyle/>
+          <a:p>
+            <a:pPr algn="ctr"/>
+            <a:r>
+              <a:rPr lang="en-GB" dirty="0"/>
+              <a:t>Continuous deployment </a:t>
+            </a:r>
+            <a:r>
+              <a:rPr lang="en-GB" b="1" dirty="0"/>
+              <a:t>(PROD)</a:t>
+            </a:r>
+          </a:p>
+        </p:txBody>
+      </p:sp>
+      <p:sp>
+        <p:nvSpPr>
+          <p:cNvPr id="12" name="Arrow: Down 11">
+            <a:extLst>
+              <a:ext uri="{FF2B5EF4-FFF2-40B4-BE49-F238E27FC236}">
+                <a16:creationId xmlns:a16="http://schemas.microsoft.com/office/drawing/2014/main" id="{04585BD0-4BF9-4B45-B6A4-7BFD9784CF31}"/>
               </a:ext>
             </a:extLst>
           </p:cNvPr>
@@ -4512,7 +4524,7 @@
         </p:nvSpPr>
         <p:spPr>
           <a:xfrm>
-            <a:off x="5903988" y="5438927"/>
+            <a:off x="5903988" y="4134281"/>
             <a:ext cx="384023" cy="727788"/>
           </a:xfrm>
           <a:prstGeom prst="downArrow">
@@ -4546,10 +4558,10 @@
       </p:sp>
       <p:sp>
         <p:nvSpPr>
-          <p:cNvPr id="14" name="Rectangle 13">
-            <a:extLst>
-              <a:ext uri="{FF2B5EF4-FFF2-40B4-BE49-F238E27FC236}">
-                <a16:creationId xmlns:a16="http://schemas.microsoft.com/office/drawing/2014/main" id="{C7B666DE-FAFF-41B3-BF2B-EF50F3DDE338}"/>
+          <p:cNvPr id="13" name="Arrow: Down 12">
+            <a:extLst>
+              <a:ext uri="{FF2B5EF4-FFF2-40B4-BE49-F238E27FC236}">
+                <a16:creationId xmlns:a16="http://schemas.microsoft.com/office/drawing/2014/main" id="{2A3A0D28-12E2-44F9-AD0A-B8F0179F0290}"/>
               </a:ext>
             </a:extLst>
           </p:cNvPr>
@@ -4558,18 +4570,12 @@
         </p:nvSpPr>
         <p:spPr>
           <a:xfrm>
-            <a:off x="671119" y="307742"/>
-            <a:ext cx="10763075" cy="819316"/>
-          </a:xfrm>
-          <a:prstGeom prst="rect">
+            <a:off x="5903988" y="5438927"/>
+            <a:ext cx="384023" cy="727788"/>
+          </a:xfrm>
+          <a:prstGeom prst="downArrow">
             <a:avLst/>
           </a:prstGeom>
-          <a:solidFill>
-            <a:schemeClr val="bg1">
-              <a:lumMod val="95000"/>
-              <a:alpha val="20000"/>
-            </a:schemeClr>
-          </a:solidFill>
         </p:spPr>
         <p:style>
           <a:lnRef idx="2">
@@ -5012,6 +5018,616 @@
     <p:extLst>
       <p:ext uri="{BB962C8B-B14F-4D97-AF65-F5344CB8AC3E}">
         <p14:creationId xmlns:p14="http://schemas.microsoft.com/office/powerpoint/2010/main" val="2899445635"/>
+      </p:ext>
+    </p:extLst>
+  </p:cSld>
+  <p:clrMapOvr>
+    <a:masterClrMapping/>
+  </p:clrMapOvr>
+</p:sld>
+</file>
+
+<file path=ppt/slides/slide4.xml><?xml version="1.0" encoding="utf-8"?>
+<p:sld xmlns:a="http://schemas.openxmlformats.org/drawingml/2006/main" xmlns:r="http://schemas.openxmlformats.org/officeDocument/2006/relationships" xmlns:p="http://schemas.openxmlformats.org/presentationml/2006/main">
+  <p:cSld>
+    <p:spTree>
+      <p:nvGrpSpPr>
+        <p:cNvPr id="1" name=""/>
+        <p:cNvGrpSpPr/>
+        <p:nvPr/>
+      </p:nvGrpSpPr>
+      <p:grpSpPr>
+        <a:xfrm>
+          <a:off x="0" y="0"/>
+          <a:ext cx="0" cy="0"/>
+          <a:chOff x="0" y="0"/>
+          <a:chExt cx="0" cy="0"/>
+        </a:xfrm>
+      </p:grpSpPr>
+      <p:sp>
+        <p:nvSpPr>
+          <p:cNvPr id="2" name="Rectangle 1">
+            <a:extLst>
+              <a:ext uri="{FF2B5EF4-FFF2-40B4-BE49-F238E27FC236}">
+                <a16:creationId xmlns:a16="http://schemas.microsoft.com/office/drawing/2014/main" id="{96206517-9579-4028-B200-8EE668F6EF18}"/>
+              </a:ext>
+            </a:extLst>
+          </p:cNvPr>
+          <p:cNvSpPr/>
+          <p:nvPr/>
+        </p:nvSpPr>
+        <p:spPr>
+          <a:xfrm>
+            <a:off x="675924" y="327152"/>
+            <a:ext cx="3527656" cy="5749109"/>
+          </a:xfrm>
+          <a:prstGeom prst="rect">
+            <a:avLst/>
+          </a:prstGeom>
+          <a:solidFill>
+            <a:schemeClr val="bg1">
+              <a:lumMod val="95000"/>
+              <a:alpha val="20000"/>
+            </a:schemeClr>
+          </a:solidFill>
+        </p:spPr>
+        <p:style>
+          <a:lnRef idx="2">
+            <a:schemeClr val="accent1">
+              <a:shade val="50000"/>
+            </a:schemeClr>
+          </a:lnRef>
+          <a:fillRef idx="1">
+            <a:schemeClr val="accent1"/>
+          </a:fillRef>
+          <a:effectRef idx="0">
+            <a:schemeClr val="accent1"/>
+          </a:effectRef>
+          <a:fontRef idx="minor">
+            <a:schemeClr val="lt1"/>
+          </a:fontRef>
+        </p:style>
+        <p:txBody>
+          <a:bodyPr rtlCol="0" anchor="ctr"/>
+          <a:lstStyle/>
+          <a:p>
+            <a:pPr algn="ctr"/>
+            <a:endParaRPr lang="en-GB"/>
+          </a:p>
+        </p:txBody>
+      </p:sp>
+      <p:sp>
+        <p:nvSpPr>
+          <p:cNvPr id="3" name="Rectangle 2">
+            <a:extLst>
+              <a:ext uri="{FF2B5EF4-FFF2-40B4-BE49-F238E27FC236}">
+                <a16:creationId xmlns:a16="http://schemas.microsoft.com/office/drawing/2014/main" id="{407BE8EF-A421-4EFE-8E5C-C103ED76DF98}"/>
+              </a:ext>
+            </a:extLst>
+          </p:cNvPr>
+          <p:cNvSpPr/>
+          <p:nvPr/>
+        </p:nvSpPr>
+        <p:spPr>
+          <a:xfrm>
+            <a:off x="6830037" y="242027"/>
+            <a:ext cx="2718032" cy="2769621"/>
+          </a:xfrm>
+          <a:prstGeom prst="rect">
+            <a:avLst/>
+          </a:prstGeom>
+          <a:solidFill>
+            <a:schemeClr val="bg1">
+              <a:lumMod val="95000"/>
+              <a:alpha val="20000"/>
+            </a:schemeClr>
+          </a:solidFill>
+        </p:spPr>
+        <p:style>
+          <a:lnRef idx="2">
+            <a:schemeClr val="accent1">
+              <a:shade val="50000"/>
+            </a:schemeClr>
+          </a:lnRef>
+          <a:fillRef idx="1">
+            <a:schemeClr val="accent1"/>
+          </a:fillRef>
+          <a:effectRef idx="0">
+            <a:schemeClr val="accent1"/>
+          </a:effectRef>
+          <a:fontRef idx="minor">
+            <a:schemeClr val="lt1"/>
+          </a:fontRef>
+        </p:style>
+        <p:txBody>
+          <a:bodyPr rtlCol="0" anchor="ctr"/>
+          <a:lstStyle/>
+          <a:p>
+            <a:pPr algn="ctr"/>
+            <a:endParaRPr lang="en-GB"/>
+          </a:p>
+        </p:txBody>
+      </p:sp>
+      <p:sp>
+        <p:nvSpPr>
+          <p:cNvPr id="4" name="Rectangle 3">
+            <a:extLst>
+              <a:ext uri="{FF2B5EF4-FFF2-40B4-BE49-F238E27FC236}">
+                <a16:creationId xmlns:a16="http://schemas.microsoft.com/office/drawing/2014/main" id="{E585892E-8299-4D97-ADB7-887A8791E34C}"/>
+              </a:ext>
+            </a:extLst>
+          </p:cNvPr>
+          <p:cNvSpPr/>
+          <p:nvPr/>
+        </p:nvSpPr>
+        <p:spPr>
+          <a:xfrm>
+            <a:off x="6806725" y="3689901"/>
+            <a:ext cx="2718032" cy="2366949"/>
+          </a:xfrm>
+          <a:prstGeom prst="rect">
+            <a:avLst/>
+          </a:prstGeom>
+          <a:solidFill>
+            <a:schemeClr val="bg1">
+              <a:lumMod val="95000"/>
+              <a:alpha val="20000"/>
+            </a:schemeClr>
+          </a:solidFill>
+        </p:spPr>
+        <p:style>
+          <a:lnRef idx="2">
+            <a:schemeClr val="accent1">
+              <a:shade val="50000"/>
+            </a:schemeClr>
+          </a:lnRef>
+          <a:fillRef idx="1">
+            <a:schemeClr val="accent1"/>
+          </a:fillRef>
+          <a:effectRef idx="0">
+            <a:schemeClr val="accent1"/>
+          </a:effectRef>
+          <a:fontRef idx="minor">
+            <a:schemeClr val="lt1"/>
+          </a:fontRef>
+        </p:style>
+        <p:txBody>
+          <a:bodyPr rtlCol="0" anchor="ctr"/>
+          <a:lstStyle/>
+          <a:p>
+            <a:pPr algn="ctr"/>
+            <a:endParaRPr lang="en-GB"/>
+          </a:p>
+        </p:txBody>
+      </p:sp>
+      <p:sp>
+        <p:nvSpPr>
+          <p:cNvPr id="5" name="Arrow: Left-Right 4">
+            <a:extLst>
+              <a:ext uri="{FF2B5EF4-FFF2-40B4-BE49-F238E27FC236}">
+                <a16:creationId xmlns:a16="http://schemas.microsoft.com/office/drawing/2014/main" id="{1AD774C8-27B6-4E68-B327-24ABA9829165}"/>
+              </a:ext>
+            </a:extLst>
+          </p:cNvPr>
+          <p:cNvSpPr/>
+          <p:nvPr/>
+        </p:nvSpPr>
+        <p:spPr>
+          <a:xfrm>
+            <a:off x="4472727" y="838899"/>
+            <a:ext cx="1819016" cy="704675"/>
+          </a:xfrm>
+          <a:prstGeom prst="leftRightArrow">
+            <a:avLst/>
+          </a:prstGeom>
+        </p:spPr>
+        <p:style>
+          <a:lnRef idx="2">
+            <a:schemeClr val="accent1">
+              <a:shade val="50000"/>
+            </a:schemeClr>
+          </a:lnRef>
+          <a:fillRef idx="1">
+            <a:schemeClr val="accent1"/>
+          </a:fillRef>
+          <a:effectRef idx="0">
+            <a:schemeClr val="accent1"/>
+          </a:effectRef>
+          <a:fontRef idx="minor">
+            <a:schemeClr val="lt1"/>
+          </a:fontRef>
+        </p:style>
+        <p:txBody>
+          <a:bodyPr rtlCol="0" anchor="ctr"/>
+          <a:lstStyle/>
+          <a:p>
+            <a:pPr algn="ctr"/>
+            <a:endParaRPr lang="en-GB"/>
+          </a:p>
+        </p:txBody>
+      </p:sp>
+      <p:sp>
+        <p:nvSpPr>
+          <p:cNvPr id="6" name="Arrow: Left-Right 5">
+            <a:extLst>
+              <a:ext uri="{FF2B5EF4-FFF2-40B4-BE49-F238E27FC236}">
+                <a16:creationId xmlns:a16="http://schemas.microsoft.com/office/drawing/2014/main" id="{25BACB7A-F56B-450A-8C5C-386A5965790C}"/>
+              </a:ext>
+            </a:extLst>
+          </p:cNvPr>
+          <p:cNvSpPr/>
+          <p:nvPr/>
+        </p:nvSpPr>
+        <p:spPr>
+          <a:xfrm>
+            <a:off x="4472727" y="4873375"/>
+            <a:ext cx="1819016" cy="704675"/>
+          </a:xfrm>
+          <a:prstGeom prst="leftRightArrow">
+            <a:avLst/>
+          </a:prstGeom>
+        </p:spPr>
+        <p:style>
+          <a:lnRef idx="2">
+            <a:schemeClr val="accent1">
+              <a:shade val="50000"/>
+            </a:schemeClr>
+          </a:lnRef>
+          <a:fillRef idx="1">
+            <a:schemeClr val="accent1"/>
+          </a:fillRef>
+          <a:effectRef idx="0">
+            <a:schemeClr val="accent1"/>
+          </a:effectRef>
+          <a:fontRef idx="minor">
+            <a:schemeClr val="lt1"/>
+          </a:fontRef>
+        </p:style>
+        <p:txBody>
+          <a:bodyPr rtlCol="0" anchor="ctr"/>
+          <a:lstStyle/>
+          <a:p>
+            <a:pPr algn="ctr"/>
+            <a:endParaRPr lang="en-GB"/>
+          </a:p>
+        </p:txBody>
+      </p:sp>
+      <p:pic>
+        <p:nvPicPr>
+          <p:cNvPr id="8" name="Graphic 7">
+            <a:extLst>
+              <a:ext uri="{FF2B5EF4-FFF2-40B4-BE49-F238E27FC236}">
+                <a16:creationId xmlns:a16="http://schemas.microsoft.com/office/drawing/2014/main" id="{F187DAD6-F7A6-46E4-AE6D-1959D21E6679}"/>
+              </a:ext>
+            </a:extLst>
+          </p:cNvPr>
+          <p:cNvPicPr>
+            <a:picLocks noChangeAspect="1"/>
+          </p:cNvPicPr>
+          <p:nvPr/>
+        </p:nvPicPr>
+        <p:blipFill>
+          <a:blip r:embed="rId2">
+            <a:extLst>
+              <a:ext uri="{28A0092B-C50C-407E-A947-70E740481C1C}">
+                <a14:useLocalDpi xmlns:a14="http://schemas.microsoft.com/office/drawing/2010/main" val="0"/>
+              </a:ext>
+              <a:ext uri="{96DAC541-7B7A-43D3-8B79-37D633B846F1}">
+                <asvg:svgBlip xmlns:asvg="http://schemas.microsoft.com/office/drawing/2016/SVG/main" r:embed="rId3"/>
+              </a:ext>
+            </a:extLst>
+          </a:blip>
+          <a:stretch>
+            <a:fillRect/>
+          </a:stretch>
+        </p:blipFill>
+        <p:spPr>
+          <a:xfrm>
+            <a:off x="7913612" y="389887"/>
+            <a:ext cx="504258" cy="504258"/>
+          </a:xfrm>
+          <a:prstGeom prst="rect">
+            <a:avLst/>
+          </a:prstGeom>
+        </p:spPr>
+      </p:pic>
+      <p:pic>
+        <p:nvPicPr>
+          <p:cNvPr id="10" name="Graphic 9">
+            <a:extLst>
+              <a:ext uri="{FF2B5EF4-FFF2-40B4-BE49-F238E27FC236}">
+                <a16:creationId xmlns:a16="http://schemas.microsoft.com/office/drawing/2014/main" id="{476F22AF-2F39-41CD-BF7F-A78D800E7C52}"/>
+              </a:ext>
+            </a:extLst>
+          </p:cNvPr>
+          <p:cNvPicPr>
+            <a:picLocks noChangeAspect="1"/>
+          </p:cNvPicPr>
+          <p:nvPr/>
+        </p:nvPicPr>
+        <p:blipFill>
+          <a:blip r:embed="rId4">
+            <a:extLst>
+              <a:ext uri="{28A0092B-C50C-407E-A947-70E740481C1C}">
+                <a14:useLocalDpi xmlns:a14="http://schemas.microsoft.com/office/drawing/2010/main" val="0"/>
+              </a:ext>
+              <a:ext uri="{96DAC541-7B7A-43D3-8B79-37D633B846F1}">
+                <asvg:svgBlip xmlns:asvg="http://schemas.microsoft.com/office/drawing/2016/SVG/main" r:embed="rId5"/>
+              </a:ext>
+            </a:extLst>
+          </a:blip>
+          <a:stretch>
+            <a:fillRect/>
+          </a:stretch>
+        </p:blipFill>
+        <p:spPr>
+          <a:xfrm>
+            <a:off x="7993789" y="3779501"/>
+            <a:ext cx="504000" cy="504000"/>
+          </a:xfrm>
+          <a:prstGeom prst="rect">
+            <a:avLst/>
+          </a:prstGeom>
+        </p:spPr>
+      </p:pic>
+      <p:sp>
+        <p:nvSpPr>
+          <p:cNvPr id="11" name="TextBox 10">
+            <a:extLst>
+              <a:ext uri="{FF2B5EF4-FFF2-40B4-BE49-F238E27FC236}">
+                <a16:creationId xmlns:a16="http://schemas.microsoft.com/office/drawing/2014/main" id="{D4BA7C0D-7556-4CCE-A31F-62B9C8A61BDC}"/>
+              </a:ext>
+            </a:extLst>
+          </p:cNvPr>
+          <p:cNvSpPr txBox="1"/>
+          <p:nvPr/>
+        </p:nvSpPr>
+        <p:spPr>
+          <a:xfrm>
+            <a:off x="6983492" y="977126"/>
+            <a:ext cx="2470901" cy="646331"/>
+          </a:xfrm>
+          <a:prstGeom prst="rect">
+            <a:avLst/>
+          </a:prstGeom>
+          <a:solidFill>
+            <a:schemeClr val="tx2">
+              <a:lumMod val="20000"/>
+              <a:lumOff val="80000"/>
+            </a:schemeClr>
+          </a:solidFill>
+        </p:spPr>
+        <p:txBody>
+          <a:bodyPr wrap="square" rtlCol="0">
+            <a:spAutoFit/>
+          </a:bodyPr>
+          <a:lstStyle/>
+          <a:p>
+            <a:pPr algn="ctr"/>
+            <a:r>
+              <a:rPr lang="en-GB" dirty="0"/>
+              <a:t>Azure Web App(</a:t>
+            </a:r>
+            <a:r>
+              <a:rPr lang="en-GB" b="1" dirty="0"/>
+              <a:t>C#, REST</a:t>
+            </a:r>
+            <a:r>
+              <a:rPr lang="en-GB" dirty="0"/>
+              <a:t>)</a:t>
+            </a:r>
+          </a:p>
+        </p:txBody>
+      </p:sp>
+      <p:pic>
+        <p:nvPicPr>
+          <p:cNvPr id="13" name="Graphic 12">
+            <a:extLst>
+              <a:ext uri="{FF2B5EF4-FFF2-40B4-BE49-F238E27FC236}">
+                <a16:creationId xmlns:a16="http://schemas.microsoft.com/office/drawing/2014/main" id="{F7906A77-5C07-4E0F-8B87-A01B9A940D04}"/>
+              </a:ext>
+            </a:extLst>
+          </p:cNvPr>
+          <p:cNvPicPr>
+            <a:picLocks noChangeAspect="1"/>
+          </p:cNvPicPr>
+          <p:nvPr/>
+        </p:nvPicPr>
+        <p:blipFill>
+          <a:blip r:embed="rId6">
+            <a:extLst>
+              <a:ext uri="{28A0092B-C50C-407E-A947-70E740481C1C}">
+                <a14:useLocalDpi xmlns:a14="http://schemas.microsoft.com/office/drawing/2010/main" val="0"/>
+              </a:ext>
+              <a:ext uri="{96DAC541-7B7A-43D3-8B79-37D633B846F1}">
+                <asvg:svgBlip xmlns:asvg="http://schemas.microsoft.com/office/drawing/2016/SVG/main" r:embed="rId7"/>
+              </a:ext>
+            </a:extLst>
+          </a:blip>
+          <a:stretch>
+            <a:fillRect/>
+          </a:stretch>
+        </p:blipFill>
+        <p:spPr>
+          <a:xfrm>
+            <a:off x="7960233" y="1803078"/>
+            <a:ext cx="504000" cy="504000"/>
+          </a:xfrm>
+          <a:prstGeom prst="rect">
+            <a:avLst/>
+          </a:prstGeom>
+        </p:spPr>
+      </p:pic>
+      <p:sp>
+        <p:nvSpPr>
+          <p:cNvPr id="14" name="TextBox 13">
+            <a:extLst>
+              <a:ext uri="{FF2B5EF4-FFF2-40B4-BE49-F238E27FC236}">
+                <a16:creationId xmlns:a16="http://schemas.microsoft.com/office/drawing/2014/main" id="{BC80E4ED-8A6E-44CB-878A-EDA07688EBD2}"/>
+              </a:ext>
+            </a:extLst>
+          </p:cNvPr>
+          <p:cNvSpPr txBox="1"/>
+          <p:nvPr/>
+        </p:nvSpPr>
+        <p:spPr>
+          <a:xfrm>
+            <a:off x="6953602" y="2364984"/>
+            <a:ext cx="2470901" cy="369332"/>
+          </a:xfrm>
+          <a:prstGeom prst="rect">
+            <a:avLst/>
+          </a:prstGeom>
+          <a:solidFill>
+            <a:schemeClr val="tx2">
+              <a:lumMod val="20000"/>
+              <a:lumOff val="80000"/>
+            </a:schemeClr>
+          </a:solidFill>
+        </p:spPr>
+        <p:txBody>
+          <a:bodyPr wrap="square" rtlCol="0">
+            <a:spAutoFit/>
+          </a:bodyPr>
+          <a:lstStyle/>
+          <a:p>
+            <a:pPr algn="ctr"/>
+            <a:r>
+              <a:rPr lang="en-GB" dirty="0"/>
+              <a:t>Azure App Service Plan</a:t>
+            </a:r>
+          </a:p>
+        </p:txBody>
+      </p:sp>
+      <p:sp>
+        <p:nvSpPr>
+          <p:cNvPr id="15" name="TextBox 14">
+            <a:extLst>
+              <a:ext uri="{FF2B5EF4-FFF2-40B4-BE49-F238E27FC236}">
+                <a16:creationId xmlns:a16="http://schemas.microsoft.com/office/drawing/2014/main" id="{BCB9E5D4-6E7A-4241-B825-5E463D4B791F}"/>
+              </a:ext>
+            </a:extLst>
+          </p:cNvPr>
+          <p:cNvSpPr txBox="1"/>
+          <p:nvPr/>
+        </p:nvSpPr>
+        <p:spPr>
+          <a:xfrm>
+            <a:off x="6953602" y="4503440"/>
+            <a:ext cx="2470901" cy="646331"/>
+          </a:xfrm>
+          <a:prstGeom prst="rect">
+            <a:avLst/>
+          </a:prstGeom>
+          <a:solidFill>
+            <a:schemeClr val="tx2">
+              <a:lumMod val="20000"/>
+              <a:lumOff val="80000"/>
+            </a:schemeClr>
+          </a:solidFill>
+        </p:spPr>
+        <p:txBody>
+          <a:bodyPr wrap="square" rtlCol="0">
+            <a:spAutoFit/>
+          </a:bodyPr>
+          <a:lstStyle/>
+          <a:p>
+            <a:pPr algn="ctr"/>
+            <a:r>
+              <a:rPr lang="en-GB" dirty="0"/>
+              <a:t>Azure storage account (</a:t>
+            </a:r>
+            <a:r>
+              <a:rPr lang="en-GB" b="1" dirty="0"/>
+              <a:t>HTML, JS</a:t>
+            </a:r>
+            <a:r>
+              <a:rPr lang="en-GB" dirty="0"/>
+              <a:t>)</a:t>
+            </a:r>
+          </a:p>
+        </p:txBody>
+      </p:sp>
+      <p:sp>
+        <p:nvSpPr>
+          <p:cNvPr id="16" name="TextBox 15">
+            <a:extLst>
+              <a:ext uri="{FF2B5EF4-FFF2-40B4-BE49-F238E27FC236}">
+                <a16:creationId xmlns:a16="http://schemas.microsoft.com/office/drawing/2014/main" id="{6261AA32-2044-4012-AC71-3E6805C8879B}"/>
+              </a:ext>
+            </a:extLst>
+          </p:cNvPr>
+          <p:cNvSpPr txBox="1"/>
+          <p:nvPr/>
+        </p:nvSpPr>
+        <p:spPr>
+          <a:xfrm>
+            <a:off x="1108189" y="2794748"/>
+            <a:ext cx="2470901" cy="369332"/>
+          </a:xfrm>
+          <a:prstGeom prst="rect">
+            <a:avLst/>
+          </a:prstGeom>
+          <a:solidFill>
+            <a:schemeClr val="tx2">
+              <a:lumMod val="20000"/>
+              <a:lumOff val="80000"/>
+            </a:schemeClr>
+          </a:solidFill>
+        </p:spPr>
+        <p:txBody>
+          <a:bodyPr wrap="square" rtlCol="0">
+            <a:spAutoFit/>
+          </a:bodyPr>
+          <a:lstStyle/>
+          <a:p>
+            <a:pPr algn="ctr"/>
+            <a:r>
+              <a:rPr lang="en-GB" dirty="0"/>
+              <a:t>Web browser</a:t>
+            </a:r>
+          </a:p>
+        </p:txBody>
+      </p:sp>
+      <p:pic>
+        <p:nvPicPr>
+          <p:cNvPr id="18" name="Picture 17">
+            <a:extLst>
+              <a:ext uri="{FF2B5EF4-FFF2-40B4-BE49-F238E27FC236}">
+                <a16:creationId xmlns:a16="http://schemas.microsoft.com/office/drawing/2014/main" id="{5887F615-1760-4166-B33F-4E1B0A1416FD}"/>
+              </a:ext>
+            </a:extLst>
+          </p:cNvPr>
+          <p:cNvPicPr>
+            <a:picLocks noChangeAspect="1"/>
+          </p:cNvPicPr>
+          <p:nvPr/>
+        </p:nvPicPr>
+        <p:blipFill>
+          <a:blip r:embed="rId8"/>
+          <a:stretch>
+            <a:fillRect/>
+          </a:stretch>
+        </p:blipFill>
+        <p:spPr>
+          <a:xfrm>
+            <a:off x="794685" y="3483277"/>
+            <a:ext cx="3097910" cy="635717"/>
+          </a:xfrm>
+          <a:prstGeom prst="rect">
+            <a:avLst/>
+          </a:prstGeom>
+          <a:ln>
+            <a:solidFill>
+              <a:schemeClr val="accent1"/>
+            </a:solidFill>
+          </a:ln>
+        </p:spPr>
+      </p:pic>
+    </p:spTree>
+    <p:extLst>
+      <p:ext uri="{BB962C8B-B14F-4D97-AF65-F5344CB8AC3E}">
+        <p14:creationId xmlns:p14="http://schemas.microsoft.com/office/powerpoint/2010/main" val="2439955096"/>
       </p:ext>
     </p:extLst>
   </p:cSld>

</xml_diff>

<commit_message>
Completed How does CD stage get triggerred
</commit_message>
<xml_diff>
--- a/DemoWebAppWithCiCd/docs/cicd.pptx
+++ b/DemoWebAppWithCiCd/docs/cicd.pptx
@@ -10,6 +10,11 @@
     <p:sldId id="258" r:id="rId4"/>
     <p:sldId id="259" r:id="rId5"/>
     <p:sldId id="260" r:id="rId6"/>
+    <p:sldId id="261" r:id="rId7"/>
+    <p:sldId id="262" r:id="rId8"/>
+    <p:sldId id="263" r:id="rId9"/>
+    <p:sldId id="264" r:id="rId10"/>
+    <p:sldId id="265" r:id="rId11"/>
   </p:sldIdLst>
   <p:sldSz cx="12192000" cy="6858000"/>
   <p:notesSz cx="6858000" cy="9144000"/>
@@ -265,7 +270,7 @@
           <a:p>
             <a:fld id="{BF07A079-B31B-4090-91C5-D173FD87E491}" type="datetimeFigureOut">
               <a:rPr lang="en-GB" smtClean="0"/>
-              <a:t>15/02/2022</a:t>
+              <a:t>16/02/2022</a:t>
             </a:fld>
             <a:endParaRPr lang="en-GB"/>
           </a:p>
@@ -465,7 +470,7 @@
           <a:p>
             <a:fld id="{BF07A079-B31B-4090-91C5-D173FD87E491}" type="datetimeFigureOut">
               <a:rPr lang="en-GB" smtClean="0"/>
-              <a:t>15/02/2022</a:t>
+              <a:t>16/02/2022</a:t>
             </a:fld>
             <a:endParaRPr lang="en-GB"/>
           </a:p>
@@ -675,7 +680,7 @@
           <a:p>
             <a:fld id="{BF07A079-B31B-4090-91C5-D173FD87E491}" type="datetimeFigureOut">
               <a:rPr lang="en-GB" smtClean="0"/>
-              <a:t>15/02/2022</a:t>
+              <a:t>16/02/2022</a:t>
             </a:fld>
             <a:endParaRPr lang="en-GB"/>
           </a:p>
@@ -875,7 +880,7 @@
           <a:p>
             <a:fld id="{BF07A079-B31B-4090-91C5-D173FD87E491}" type="datetimeFigureOut">
               <a:rPr lang="en-GB" smtClean="0"/>
-              <a:t>15/02/2022</a:t>
+              <a:t>16/02/2022</a:t>
             </a:fld>
             <a:endParaRPr lang="en-GB"/>
           </a:p>
@@ -1151,7 +1156,7 @@
           <a:p>
             <a:fld id="{BF07A079-B31B-4090-91C5-D173FD87E491}" type="datetimeFigureOut">
               <a:rPr lang="en-GB" smtClean="0"/>
-              <a:t>15/02/2022</a:t>
+              <a:t>16/02/2022</a:t>
             </a:fld>
             <a:endParaRPr lang="en-GB"/>
           </a:p>
@@ -1419,7 +1424,7 @@
           <a:p>
             <a:fld id="{BF07A079-B31B-4090-91C5-D173FD87E491}" type="datetimeFigureOut">
               <a:rPr lang="en-GB" smtClean="0"/>
-              <a:t>15/02/2022</a:t>
+              <a:t>16/02/2022</a:t>
             </a:fld>
             <a:endParaRPr lang="en-GB"/>
           </a:p>
@@ -1834,7 +1839,7 @@
           <a:p>
             <a:fld id="{BF07A079-B31B-4090-91C5-D173FD87E491}" type="datetimeFigureOut">
               <a:rPr lang="en-GB" smtClean="0"/>
-              <a:t>15/02/2022</a:t>
+              <a:t>16/02/2022</a:t>
             </a:fld>
             <a:endParaRPr lang="en-GB"/>
           </a:p>
@@ -1976,7 +1981,7 @@
           <a:p>
             <a:fld id="{BF07A079-B31B-4090-91C5-D173FD87E491}" type="datetimeFigureOut">
               <a:rPr lang="en-GB" smtClean="0"/>
-              <a:t>15/02/2022</a:t>
+              <a:t>16/02/2022</a:t>
             </a:fld>
             <a:endParaRPr lang="en-GB"/>
           </a:p>
@@ -2089,7 +2094,7 @@
           <a:p>
             <a:fld id="{BF07A079-B31B-4090-91C5-D173FD87E491}" type="datetimeFigureOut">
               <a:rPr lang="en-GB" smtClean="0"/>
-              <a:t>15/02/2022</a:t>
+              <a:t>16/02/2022</a:t>
             </a:fld>
             <a:endParaRPr lang="en-GB"/>
           </a:p>
@@ -2402,7 +2407,7 @@
           <a:p>
             <a:fld id="{BF07A079-B31B-4090-91C5-D173FD87E491}" type="datetimeFigureOut">
               <a:rPr lang="en-GB" smtClean="0"/>
-              <a:t>15/02/2022</a:t>
+              <a:t>16/02/2022</a:t>
             </a:fld>
             <a:endParaRPr lang="en-GB"/>
           </a:p>
@@ -2691,7 +2696,7 @@
           <a:p>
             <a:fld id="{BF07A079-B31B-4090-91C5-D173FD87E491}" type="datetimeFigureOut">
               <a:rPr lang="en-GB" smtClean="0"/>
-              <a:t>15/02/2022</a:t>
+              <a:t>16/02/2022</a:t>
             </a:fld>
             <a:endParaRPr lang="en-GB"/>
           </a:p>
@@ -2934,7 +2939,7 @@
           <a:p>
             <a:fld id="{BF07A079-B31B-4090-91C5-D173FD87E491}" type="datetimeFigureOut">
               <a:rPr lang="en-GB" smtClean="0"/>
-              <a:t>15/02/2022</a:t>
+              <a:t>16/02/2022</a:t>
             </a:fld>
             <a:endParaRPr lang="en-GB"/>
           </a:p>
@@ -3414,6 +3419,242 @@
 </p:sld>
 </file>
 
+<file path=ppt/slides/slide10.xml><?xml version="1.0" encoding="utf-8"?>
+<p:sld xmlns:a="http://schemas.openxmlformats.org/drawingml/2006/main" xmlns:r="http://schemas.openxmlformats.org/officeDocument/2006/relationships" xmlns:p="http://schemas.openxmlformats.org/presentationml/2006/main">
+  <p:cSld>
+    <p:spTree>
+      <p:nvGrpSpPr>
+        <p:cNvPr id="1" name=""/>
+        <p:cNvGrpSpPr/>
+        <p:nvPr/>
+      </p:nvGrpSpPr>
+      <p:grpSpPr>
+        <a:xfrm>
+          <a:off x="0" y="0"/>
+          <a:ext cx="0" cy="0"/>
+          <a:chOff x="0" y="0"/>
+          <a:chExt cx="0" cy="0"/>
+        </a:xfrm>
+      </p:grpSpPr>
+      <p:pic>
+        <p:nvPicPr>
+          <p:cNvPr id="3" name="Picture 2">
+            <a:extLst>
+              <a:ext uri="{FF2B5EF4-FFF2-40B4-BE49-F238E27FC236}">
+                <a16:creationId xmlns:a16="http://schemas.microsoft.com/office/drawing/2014/main" id="{1A27965C-CC44-4556-BD45-13CAC76DFDC5}"/>
+              </a:ext>
+            </a:extLst>
+          </p:cNvPr>
+          <p:cNvPicPr>
+            <a:picLocks noChangeAspect="1"/>
+          </p:cNvPicPr>
+          <p:nvPr/>
+        </p:nvPicPr>
+        <p:blipFill>
+          <a:blip r:embed="rId2"/>
+          <a:stretch>
+            <a:fillRect/>
+          </a:stretch>
+        </p:blipFill>
+        <p:spPr>
+          <a:xfrm>
+            <a:off x="1676709" y="0"/>
+            <a:ext cx="4271086" cy="3314005"/>
+          </a:xfrm>
+          <a:prstGeom prst="rect">
+            <a:avLst/>
+          </a:prstGeom>
+        </p:spPr>
+      </p:pic>
+      <p:sp>
+        <p:nvSpPr>
+          <p:cNvPr id="6" name="Callout: Line 5">
+            <a:extLst>
+              <a:ext uri="{FF2B5EF4-FFF2-40B4-BE49-F238E27FC236}">
+                <a16:creationId xmlns:a16="http://schemas.microsoft.com/office/drawing/2014/main" id="{A2AA75C7-E1AA-475C-951E-8198CB88DA8E}"/>
+              </a:ext>
+            </a:extLst>
+          </p:cNvPr>
+          <p:cNvSpPr/>
+          <p:nvPr/>
+        </p:nvSpPr>
+        <p:spPr>
+          <a:xfrm>
+            <a:off x="127432" y="4915233"/>
+            <a:ext cx="4411012" cy="780176"/>
+          </a:xfrm>
+          <a:prstGeom prst="borderCallout1">
+            <a:avLst>
+              <a:gd name="adj1" fmla="val -3831"/>
+              <a:gd name="adj2" fmla="val 45805"/>
+              <a:gd name="adj3" fmla="val -452962"/>
+              <a:gd name="adj4" fmla="val 89262"/>
+            </a:avLst>
+          </a:prstGeom>
+          <a:solidFill>
+            <a:schemeClr val="accent4">
+              <a:lumMod val="40000"/>
+              <a:lumOff val="60000"/>
+            </a:schemeClr>
+          </a:solidFill>
+        </p:spPr>
+        <p:style>
+          <a:lnRef idx="2">
+            <a:schemeClr val="accent1">
+              <a:shade val="50000"/>
+            </a:schemeClr>
+          </a:lnRef>
+          <a:fillRef idx="1">
+            <a:schemeClr val="accent1"/>
+          </a:fillRef>
+          <a:effectRef idx="0">
+            <a:schemeClr val="accent1"/>
+          </a:effectRef>
+          <a:fontRef idx="minor">
+            <a:schemeClr val="lt1"/>
+          </a:fontRef>
+        </p:style>
+        <p:txBody>
+          <a:bodyPr rtlCol="0" anchor="ctr"/>
+          <a:lstStyle/>
+          <a:p>
+            <a:pPr algn="ctr"/>
+            <a:r>
+              <a:rPr lang="en-GB" dirty="0">
+                <a:solidFill>
+                  <a:schemeClr val="tx1"/>
+                </a:solidFill>
+              </a:rPr>
+              <a:t>We specify the user or group of users who are authorized to run the </a:t>
+            </a:r>
+            <a:r>
+              <a:rPr lang="en-GB" b="1" dirty="0">
+                <a:solidFill>
+                  <a:schemeClr val="tx1"/>
+                </a:solidFill>
+              </a:rPr>
+              <a:t>PROD</a:t>
+            </a:r>
+            <a:r>
+              <a:rPr lang="en-GB" dirty="0">
+                <a:solidFill>
+                  <a:schemeClr val="tx1"/>
+                </a:solidFill>
+              </a:rPr>
+              <a:t> stage</a:t>
+            </a:r>
+          </a:p>
+          <a:p>
+            <a:pPr algn="ctr"/>
+            <a:endParaRPr lang="en-GB" dirty="0">
+              <a:solidFill>
+                <a:schemeClr val="tx1"/>
+              </a:solidFill>
+            </a:endParaRPr>
+          </a:p>
+        </p:txBody>
+      </p:sp>
+      <p:sp>
+        <p:nvSpPr>
+          <p:cNvPr id="7" name="Callout: Line 6">
+            <a:extLst>
+              <a:ext uri="{FF2B5EF4-FFF2-40B4-BE49-F238E27FC236}">
+                <a16:creationId xmlns:a16="http://schemas.microsoft.com/office/drawing/2014/main" id="{B496970E-7627-42FA-A16D-6249343B8B36}"/>
+              </a:ext>
+            </a:extLst>
+          </p:cNvPr>
+          <p:cNvSpPr/>
+          <p:nvPr/>
+        </p:nvSpPr>
+        <p:spPr>
+          <a:xfrm>
+            <a:off x="5722888" y="4915233"/>
+            <a:ext cx="4050285" cy="780176"/>
+          </a:xfrm>
+          <a:prstGeom prst="borderCallout1">
+            <a:avLst>
+              <a:gd name="adj1" fmla="val -3831"/>
+              <a:gd name="adj2" fmla="val 45805"/>
+              <a:gd name="adj3" fmla="val -502424"/>
+              <a:gd name="adj4" fmla="val -3431"/>
+            </a:avLst>
+          </a:prstGeom>
+          <a:solidFill>
+            <a:schemeClr val="accent4">
+              <a:lumMod val="40000"/>
+              <a:lumOff val="60000"/>
+            </a:schemeClr>
+          </a:solidFill>
+        </p:spPr>
+        <p:style>
+          <a:lnRef idx="2">
+            <a:schemeClr val="accent1">
+              <a:shade val="50000"/>
+            </a:schemeClr>
+          </a:lnRef>
+          <a:fillRef idx="1">
+            <a:schemeClr val="accent1"/>
+          </a:fillRef>
+          <a:effectRef idx="0">
+            <a:schemeClr val="accent1"/>
+          </a:effectRef>
+          <a:fontRef idx="minor">
+            <a:schemeClr val="lt1"/>
+          </a:fontRef>
+        </p:style>
+        <p:txBody>
+          <a:bodyPr rtlCol="0" anchor="ctr"/>
+          <a:lstStyle/>
+          <a:p>
+            <a:pPr algn="ctr"/>
+            <a:r>
+              <a:rPr lang="en-GB" dirty="0">
+                <a:solidFill>
+                  <a:schemeClr val="tx1"/>
+                </a:solidFill>
+              </a:rPr>
+              <a:t>We specify here that </a:t>
+            </a:r>
+            <a:r>
+              <a:rPr lang="en-GB" b="1" dirty="0">
+                <a:solidFill>
+                  <a:schemeClr val="tx1"/>
+                </a:solidFill>
+              </a:rPr>
+              <a:t>PROD</a:t>
+            </a:r>
+            <a:r>
+              <a:rPr lang="en-GB" dirty="0">
+                <a:solidFill>
+                  <a:schemeClr val="tx1"/>
+                </a:solidFill>
+              </a:rPr>
+              <a:t> stage requires a human operator to approve</a:t>
+            </a:r>
+          </a:p>
+          <a:p>
+            <a:pPr algn="ctr"/>
+            <a:endParaRPr lang="en-GB" dirty="0">
+              <a:solidFill>
+                <a:schemeClr val="tx1"/>
+              </a:solidFill>
+            </a:endParaRPr>
+          </a:p>
+        </p:txBody>
+      </p:sp>
+    </p:spTree>
+    <p:extLst>
+      <p:ext uri="{BB962C8B-B14F-4D97-AF65-F5344CB8AC3E}">
+        <p14:creationId xmlns:p14="http://schemas.microsoft.com/office/powerpoint/2010/main" val="2112354238"/>
+      </p:ext>
+    </p:extLst>
+  </p:cSld>
+  <p:clrMapOvr>
+    <a:masterClrMapping/>
+  </p:clrMapOvr>
+</p:sld>
+</file>
+
 <file path=ppt/slides/slide2.xml><?xml version="1.0" encoding="utf-8"?>
 <p:sld xmlns:a="http://schemas.openxmlformats.org/drawingml/2006/main" xmlns:r="http://schemas.openxmlformats.org/officeDocument/2006/relationships" xmlns:p="http://schemas.openxmlformats.org/presentationml/2006/main">
   <p:cSld>
@@ -7850,6 +8091,1194 @@
     <p:extLst>
       <p:ext uri="{BB962C8B-B14F-4D97-AF65-F5344CB8AC3E}">
         <p14:creationId xmlns:p14="http://schemas.microsoft.com/office/powerpoint/2010/main" val="4244315237"/>
+      </p:ext>
+    </p:extLst>
+  </p:cSld>
+  <p:clrMapOvr>
+    <a:masterClrMapping/>
+  </p:clrMapOvr>
+</p:sld>
+</file>
+
+<file path=ppt/slides/slide6.xml><?xml version="1.0" encoding="utf-8"?>
+<p:sld xmlns:a="http://schemas.openxmlformats.org/drawingml/2006/main" xmlns:r="http://schemas.openxmlformats.org/officeDocument/2006/relationships" xmlns:p="http://schemas.openxmlformats.org/presentationml/2006/main">
+  <p:cSld>
+    <p:spTree>
+      <p:nvGrpSpPr>
+        <p:cNvPr id="1" name=""/>
+        <p:cNvGrpSpPr/>
+        <p:nvPr/>
+      </p:nvGrpSpPr>
+      <p:grpSpPr>
+        <a:xfrm>
+          <a:off x="0" y="0"/>
+          <a:ext cx="0" cy="0"/>
+          <a:chOff x="0" y="0"/>
+          <a:chExt cx="0" cy="0"/>
+        </a:xfrm>
+      </p:grpSpPr>
+      <p:pic>
+        <p:nvPicPr>
+          <p:cNvPr id="3" name="Picture 2">
+            <a:extLst>
+              <a:ext uri="{FF2B5EF4-FFF2-40B4-BE49-F238E27FC236}">
+                <a16:creationId xmlns:a16="http://schemas.microsoft.com/office/drawing/2014/main" id="{7DF94D36-AB75-4B92-A5C8-F2ED4D8EFCB8}"/>
+              </a:ext>
+            </a:extLst>
+          </p:cNvPr>
+          <p:cNvPicPr>
+            <a:picLocks noChangeAspect="1"/>
+          </p:cNvPicPr>
+          <p:nvPr/>
+        </p:nvPicPr>
+        <p:blipFill>
+          <a:blip r:embed="rId2"/>
+          <a:stretch>
+            <a:fillRect/>
+          </a:stretch>
+        </p:blipFill>
+        <p:spPr>
+          <a:xfrm>
+            <a:off x="159391" y="553929"/>
+            <a:ext cx="11873218" cy="3857119"/>
+          </a:xfrm>
+          <a:prstGeom prst="rect">
+            <a:avLst/>
+          </a:prstGeom>
+        </p:spPr>
+      </p:pic>
+      <p:sp>
+        <p:nvSpPr>
+          <p:cNvPr id="5" name="Callout: Line 4">
+            <a:extLst>
+              <a:ext uri="{FF2B5EF4-FFF2-40B4-BE49-F238E27FC236}">
+                <a16:creationId xmlns:a16="http://schemas.microsoft.com/office/drawing/2014/main" id="{7C18B9DC-3610-43CA-9DB1-4670AF7436A5}"/>
+              </a:ext>
+            </a:extLst>
+          </p:cNvPr>
+          <p:cNvSpPr/>
+          <p:nvPr/>
+        </p:nvSpPr>
+        <p:spPr>
+          <a:xfrm>
+            <a:off x="605889" y="5094233"/>
+            <a:ext cx="2432807" cy="780176"/>
+          </a:xfrm>
+          <a:prstGeom prst="borderCallout1">
+            <a:avLst>
+              <a:gd name="adj1" fmla="val -3831"/>
+              <a:gd name="adj2" fmla="val 45805"/>
+              <a:gd name="adj3" fmla="val -391801"/>
+              <a:gd name="adj4" fmla="val 45445"/>
+            </a:avLst>
+          </a:prstGeom>
+          <a:solidFill>
+            <a:schemeClr val="accent4">
+              <a:lumMod val="40000"/>
+              <a:lumOff val="60000"/>
+            </a:schemeClr>
+          </a:solidFill>
+        </p:spPr>
+        <p:style>
+          <a:lnRef idx="2">
+            <a:schemeClr val="accent1">
+              <a:shade val="50000"/>
+            </a:schemeClr>
+          </a:lnRef>
+          <a:fillRef idx="1">
+            <a:schemeClr val="accent1"/>
+          </a:fillRef>
+          <a:effectRef idx="0">
+            <a:schemeClr val="accent1"/>
+          </a:effectRef>
+          <a:fontRef idx="minor">
+            <a:schemeClr val="lt1"/>
+          </a:fontRef>
+        </p:style>
+        <p:txBody>
+          <a:bodyPr rtlCol="0" anchor="ctr"/>
+          <a:lstStyle/>
+          <a:p>
+            <a:pPr algn="ctr"/>
+            <a:r>
+              <a:rPr lang="en-GB" dirty="0">
+                <a:solidFill>
+                  <a:schemeClr val="tx1"/>
+                </a:solidFill>
+              </a:rPr>
+              <a:t>This is where you tell CD which CI artifact to pull in</a:t>
+            </a:r>
+          </a:p>
+        </p:txBody>
+      </p:sp>
+      <p:sp>
+        <p:nvSpPr>
+          <p:cNvPr id="7" name="Callout: Line 6">
+            <a:extLst>
+              <a:ext uri="{FF2B5EF4-FFF2-40B4-BE49-F238E27FC236}">
+                <a16:creationId xmlns:a16="http://schemas.microsoft.com/office/drawing/2014/main" id="{4225CABD-E226-4B09-A15F-318B2D706AA7}"/>
+              </a:ext>
+            </a:extLst>
+          </p:cNvPr>
+          <p:cNvSpPr/>
+          <p:nvPr/>
+        </p:nvSpPr>
+        <p:spPr>
+          <a:xfrm>
+            <a:off x="3343496" y="5094233"/>
+            <a:ext cx="3040526" cy="780176"/>
+          </a:xfrm>
+          <a:prstGeom prst="borderCallout1">
+            <a:avLst>
+              <a:gd name="adj1" fmla="val -3831"/>
+              <a:gd name="adj2" fmla="val 45805"/>
+              <a:gd name="adj3" fmla="val -315457"/>
+              <a:gd name="adj4" fmla="val -50071"/>
+            </a:avLst>
+          </a:prstGeom>
+          <a:solidFill>
+            <a:schemeClr val="accent4">
+              <a:lumMod val="40000"/>
+              <a:lumOff val="60000"/>
+            </a:schemeClr>
+          </a:solidFill>
+        </p:spPr>
+        <p:style>
+          <a:lnRef idx="2">
+            <a:schemeClr val="accent1">
+              <a:shade val="50000"/>
+            </a:schemeClr>
+          </a:lnRef>
+          <a:fillRef idx="1">
+            <a:schemeClr val="accent1"/>
+          </a:fillRef>
+          <a:effectRef idx="0">
+            <a:schemeClr val="accent1"/>
+          </a:effectRef>
+          <a:fontRef idx="minor">
+            <a:schemeClr val="lt1"/>
+          </a:fontRef>
+        </p:style>
+        <p:txBody>
+          <a:bodyPr rtlCol="0" anchor="ctr"/>
+          <a:lstStyle/>
+          <a:p>
+            <a:pPr algn="ctr"/>
+            <a:r>
+              <a:rPr lang="en-GB" dirty="0">
+                <a:solidFill>
+                  <a:schemeClr val="tx1"/>
+                </a:solidFill>
+              </a:rPr>
+              <a:t>This is where you configure CD to kick off each time a CI build is available</a:t>
+            </a:r>
+          </a:p>
+        </p:txBody>
+      </p:sp>
+      <p:sp>
+        <p:nvSpPr>
+          <p:cNvPr id="8" name="Callout: Line 7">
+            <a:extLst>
+              <a:ext uri="{FF2B5EF4-FFF2-40B4-BE49-F238E27FC236}">
+                <a16:creationId xmlns:a16="http://schemas.microsoft.com/office/drawing/2014/main" id="{3703B2B6-3598-42BA-A237-4AC1EDCFFC50}"/>
+              </a:ext>
+            </a:extLst>
+          </p:cNvPr>
+          <p:cNvSpPr/>
+          <p:nvPr/>
+        </p:nvSpPr>
+        <p:spPr>
+          <a:xfrm>
+            <a:off x="6915809" y="5094233"/>
+            <a:ext cx="2432807" cy="780176"/>
+          </a:xfrm>
+          <a:prstGeom prst="borderCallout1">
+            <a:avLst>
+              <a:gd name="adj1" fmla="val -3831"/>
+              <a:gd name="adj2" fmla="val 45805"/>
+              <a:gd name="adj3" fmla="val -274597"/>
+              <a:gd name="adj4" fmla="val -155589"/>
+            </a:avLst>
+          </a:prstGeom>
+          <a:solidFill>
+            <a:schemeClr val="accent4">
+              <a:lumMod val="40000"/>
+              <a:lumOff val="60000"/>
+            </a:schemeClr>
+          </a:solidFill>
+        </p:spPr>
+        <p:style>
+          <a:lnRef idx="2">
+            <a:schemeClr val="accent1">
+              <a:shade val="50000"/>
+            </a:schemeClr>
+          </a:lnRef>
+          <a:fillRef idx="1">
+            <a:schemeClr val="accent1"/>
+          </a:fillRef>
+          <a:effectRef idx="0">
+            <a:schemeClr val="accent1"/>
+          </a:effectRef>
+          <a:fontRef idx="minor">
+            <a:schemeClr val="lt1"/>
+          </a:fontRef>
+        </p:style>
+        <p:txBody>
+          <a:bodyPr rtlCol="0" anchor="ctr"/>
+          <a:lstStyle/>
+          <a:p>
+            <a:pPr algn="ctr"/>
+            <a:r>
+              <a:rPr lang="en-GB" dirty="0">
+                <a:solidFill>
+                  <a:schemeClr val="tx1"/>
+                </a:solidFill>
+              </a:rPr>
+              <a:t>We need to let DEV stage run on PR build</a:t>
+            </a:r>
+          </a:p>
+        </p:txBody>
+      </p:sp>
+      <p:sp>
+        <p:nvSpPr>
+          <p:cNvPr id="9" name="Callout: Line 8">
+            <a:extLst>
+              <a:ext uri="{FF2B5EF4-FFF2-40B4-BE49-F238E27FC236}">
+                <a16:creationId xmlns:a16="http://schemas.microsoft.com/office/drawing/2014/main" id="{738808F0-651E-43F4-AD1D-E75F584D176E}"/>
+              </a:ext>
+            </a:extLst>
+          </p:cNvPr>
+          <p:cNvSpPr/>
+          <p:nvPr/>
+        </p:nvSpPr>
+        <p:spPr>
+          <a:xfrm>
+            <a:off x="8032943" y="1085694"/>
+            <a:ext cx="2965024" cy="780176"/>
+          </a:xfrm>
+          <a:prstGeom prst="borderCallout1">
+            <a:avLst>
+              <a:gd name="adj1" fmla="val 100470"/>
+              <a:gd name="adj2" fmla="val 53391"/>
+              <a:gd name="adj3" fmla="val 246909"/>
+              <a:gd name="adj4" fmla="val 18204"/>
+            </a:avLst>
+          </a:prstGeom>
+          <a:solidFill>
+            <a:schemeClr val="accent4">
+              <a:lumMod val="40000"/>
+              <a:lumOff val="60000"/>
+            </a:schemeClr>
+          </a:solidFill>
+        </p:spPr>
+        <p:style>
+          <a:lnRef idx="2">
+            <a:schemeClr val="accent1">
+              <a:shade val="50000"/>
+            </a:schemeClr>
+          </a:lnRef>
+          <a:fillRef idx="1">
+            <a:schemeClr val="accent1"/>
+          </a:fillRef>
+          <a:effectRef idx="0">
+            <a:schemeClr val="accent1"/>
+          </a:effectRef>
+          <a:fontRef idx="minor">
+            <a:schemeClr val="lt1"/>
+          </a:fontRef>
+        </p:style>
+        <p:txBody>
+          <a:bodyPr rtlCol="0" anchor="ctr"/>
+          <a:lstStyle/>
+          <a:p>
+            <a:pPr algn="ctr"/>
+            <a:r>
+              <a:rPr lang="en-GB" dirty="0">
+                <a:solidFill>
+                  <a:schemeClr val="tx1"/>
+                </a:solidFill>
+              </a:rPr>
+              <a:t>The PROD stage should run only when approved</a:t>
+            </a:r>
+          </a:p>
+        </p:txBody>
+      </p:sp>
+    </p:spTree>
+    <p:extLst>
+      <p:ext uri="{BB962C8B-B14F-4D97-AF65-F5344CB8AC3E}">
+        <p14:creationId xmlns:p14="http://schemas.microsoft.com/office/powerpoint/2010/main" val="106715222"/>
+      </p:ext>
+    </p:extLst>
+  </p:cSld>
+  <p:clrMapOvr>
+    <a:masterClrMapping/>
+  </p:clrMapOvr>
+</p:sld>
+</file>
+
+<file path=ppt/slides/slide7.xml><?xml version="1.0" encoding="utf-8"?>
+<p:sld xmlns:a="http://schemas.openxmlformats.org/drawingml/2006/main" xmlns:r="http://schemas.openxmlformats.org/officeDocument/2006/relationships" xmlns:p="http://schemas.openxmlformats.org/presentationml/2006/main">
+  <p:cSld>
+    <p:spTree>
+      <p:nvGrpSpPr>
+        <p:cNvPr id="1" name=""/>
+        <p:cNvGrpSpPr/>
+        <p:nvPr/>
+      </p:nvGrpSpPr>
+      <p:grpSpPr>
+        <a:xfrm>
+          <a:off x="0" y="0"/>
+          <a:ext cx="0" cy="0"/>
+          <a:chOff x="0" y="0"/>
+          <a:chExt cx="0" cy="0"/>
+        </a:xfrm>
+      </p:grpSpPr>
+      <p:pic>
+        <p:nvPicPr>
+          <p:cNvPr id="3" name="Picture 2">
+            <a:extLst>
+              <a:ext uri="{FF2B5EF4-FFF2-40B4-BE49-F238E27FC236}">
+                <a16:creationId xmlns:a16="http://schemas.microsoft.com/office/drawing/2014/main" id="{3686E18C-4706-4001-8F0C-635ABFF12210}"/>
+              </a:ext>
+            </a:extLst>
+          </p:cNvPr>
+          <p:cNvPicPr>
+            <a:picLocks noChangeAspect="1"/>
+          </p:cNvPicPr>
+          <p:nvPr/>
+        </p:nvPicPr>
+        <p:blipFill>
+          <a:blip r:embed="rId2"/>
+          <a:stretch>
+            <a:fillRect/>
+          </a:stretch>
+        </p:blipFill>
+        <p:spPr>
+          <a:xfrm>
+            <a:off x="3017962" y="0"/>
+            <a:ext cx="6156075" cy="6858000"/>
+          </a:xfrm>
+          <a:prstGeom prst="rect">
+            <a:avLst/>
+          </a:prstGeom>
+        </p:spPr>
+      </p:pic>
+      <p:sp>
+        <p:nvSpPr>
+          <p:cNvPr id="4" name="Callout: Line 3">
+            <a:extLst>
+              <a:ext uri="{FF2B5EF4-FFF2-40B4-BE49-F238E27FC236}">
+                <a16:creationId xmlns:a16="http://schemas.microsoft.com/office/drawing/2014/main" id="{2ECB6851-9EF4-47AB-8D7E-B770CCDECC70}"/>
+              </a:ext>
+            </a:extLst>
+          </p:cNvPr>
+          <p:cNvSpPr/>
+          <p:nvPr/>
+        </p:nvSpPr>
+        <p:spPr>
+          <a:xfrm>
+            <a:off x="256348" y="4985177"/>
+            <a:ext cx="3040526" cy="780176"/>
+          </a:xfrm>
+          <a:prstGeom prst="borderCallout1">
+            <a:avLst>
+              <a:gd name="adj1" fmla="val -3831"/>
+              <a:gd name="adj2" fmla="val 45805"/>
+              <a:gd name="adj3" fmla="val -132531"/>
+              <a:gd name="adj4" fmla="val 140209"/>
+            </a:avLst>
+          </a:prstGeom>
+          <a:solidFill>
+            <a:schemeClr val="accent4">
+              <a:lumMod val="40000"/>
+              <a:lumOff val="60000"/>
+            </a:schemeClr>
+          </a:solidFill>
+        </p:spPr>
+        <p:style>
+          <a:lnRef idx="2">
+            <a:schemeClr val="accent1">
+              <a:shade val="50000"/>
+            </a:schemeClr>
+          </a:lnRef>
+          <a:fillRef idx="1">
+            <a:schemeClr val="accent1"/>
+          </a:fillRef>
+          <a:effectRef idx="0">
+            <a:schemeClr val="accent1"/>
+          </a:effectRef>
+          <a:fontRef idx="minor">
+            <a:schemeClr val="lt1"/>
+          </a:fontRef>
+        </p:style>
+        <p:txBody>
+          <a:bodyPr rtlCol="0" anchor="ctr"/>
+          <a:lstStyle/>
+          <a:p>
+            <a:pPr algn="ctr"/>
+            <a:r>
+              <a:rPr lang="en-GB" dirty="0">
+                <a:solidFill>
+                  <a:schemeClr val="tx1"/>
+                </a:solidFill>
+              </a:rPr>
+              <a:t>This is where you select which CI pipeline to use</a:t>
+            </a:r>
+          </a:p>
+        </p:txBody>
+      </p:sp>
+      <p:sp>
+        <p:nvSpPr>
+          <p:cNvPr id="5" name="Callout: Line 4">
+            <a:extLst>
+              <a:ext uri="{FF2B5EF4-FFF2-40B4-BE49-F238E27FC236}">
+                <a16:creationId xmlns:a16="http://schemas.microsoft.com/office/drawing/2014/main" id="{4DF86C49-AE57-4A18-802D-58D8F5424BED}"/>
+              </a:ext>
+            </a:extLst>
+          </p:cNvPr>
+          <p:cNvSpPr/>
+          <p:nvPr/>
+        </p:nvSpPr>
+        <p:spPr>
+          <a:xfrm>
+            <a:off x="7732493" y="1753442"/>
+            <a:ext cx="3633413" cy="780176"/>
+          </a:xfrm>
+          <a:prstGeom prst="borderCallout1">
+            <a:avLst>
+              <a:gd name="adj1" fmla="val -3831"/>
+              <a:gd name="adj2" fmla="val 45805"/>
+              <a:gd name="adj3" fmla="val 456777"/>
+              <a:gd name="adj4" fmla="val -120055"/>
+            </a:avLst>
+          </a:prstGeom>
+          <a:solidFill>
+            <a:schemeClr val="accent4">
+              <a:lumMod val="40000"/>
+              <a:lumOff val="60000"/>
+            </a:schemeClr>
+          </a:solidFill>
+        </p:spPr>
+        <p:style>
+          <a:lnRef idx="2">
+            <a:schemeClr val="accent1">
+              <a:shade val="50000"/>
+            </a:schemeClr>
+          </a:lnRef>
+          <a:fillRef idx="1">
+            <a:schemeClr val="accent1"/>
+          </a:fillRef>
+          <a:effectRef idx="0">
+            <a:schemeClr val="accent1"/>
+          </a:effectRef>
+          <a:fontRef idx="minor">
+            <a:schemeClr val="lt1"/>
+          </a:fontRef>
+        </p:style>
+        <p:txBody>
+          <a:bodyPr rtlCol="0" anchor="ctr"/>
+          <a:lstStyle/>
+          <a:p>
+            <a:pPr algn="ctr"/>
+            <a:r>
+              <a:rPr lang="en-GB" dirty="0">
+                <a:solidFill>
+                  <a:schemeClr val="tx1"/>
+                </a:solidFill>
+              </a:rPr>
+              <a:t>This is an alias which will be used for referencing the files under this artifact. E.g. Deploy.ps1</a:t>
+            </a:r>
+          </a:p>
+        </p:txBody>
+      </p:sp>
+      <p:sp>
+        <p:nvSpPr>
+          <p:cNvPr id="6" name="Callout: Line 5">
+            <a:extLst>
+              <a:ext uri="{FF2B5EF4-FFF2-40B4-BE49-F238E27FC236}">
+                <a16:creationId xmlns:a16="http://schemas.microsoft.com/office/drawing/2014/main" id="{03F79F28-3C7C-4042-9B4B-BB86317B2805}"/>
+              </a:ext>
+            </a:extLst>
+          </p:cNvPr>
+          <p:cNvSpPr/>
+          <p:nvPr/>
+        </p:nvSpPr>
+        <p:spPr>
+          <a:xfrm>
+            <a:off x="116892" y="1092647"/>
+            <a:ext cx="3040526" cy="780176"/>
+          </a:xfrm>
+          <a:prstGeom prst="borderCallout1">
+            <a:avLst>
+              <a:gd name="adj1" fmla="val 87084"/>
+              <a:gd name="adj2" fmla="val 90775"/>
+              <a:gd name="adj3" fmla="val 138024"/>
+              <a:gd name="adj4" fmla="val 128966"/>
+            </a:avLst>
+          </a:prstGeom>
+          <a:solidFill>
+            <a:schemeClr val="accent4">
+              <a:lumMod val="40000"/>
+              <a:lumOff val="60000"/>
+            </a:schemeClr>
+          </a:solidFill>
+        </p:spPr>
+        <p:style>
+          <a:lnRef idx="2">
+            <a:schemeClr val="accent1">
+              <a:shade val="50000"/>
+            </a:schemeClr>
+          </a:lnRef>
+          <a:fillRef idx="1">
+            <a:schemeClr val="accent1"/>
+          </a:fillRef>
+          <a:effectRef idx="0">
+            <a:schemeClr val="accent1"/>
+          </a:effectRef>
+          <a:fontRef idx="minor">
+            <a:schemeClr val="lt1"/>
+          </a:fontRef>
+        </p:style>
+        <p:txBody>
+          <a:bodyPr rtlCol="0" anchor="ctr"/>
+          <a:lstStyle/>
+          <a:p>
+            <a:pPr algn="ctr"/>
+            <a:r>
+              <a:rPr lang="en-GB" dirty="0">
+                <a:solidFill>
+                  <a:schemeClr val="tx1"/>
+                </a:solidFill>
+              </a:rPr>
+              <a:t>This is where you specify that the CD will expect a CI pipeline as the source</a:t>
+            </a:r>
+          </a:p>
+        </p:txBody>
+      </p:sp>
+    </p:spTree>
+    <p:extLst>
+      <p:ext uri="{BB962C8B-B14F-4D97-AF65-F5344CB8AC3E}">
+        <p14:creationId xmlns:p14="http://schemas.microsoft.com/office/powerpoint/2010/main" val="3782830748"/>
+      </p:ext>
+    </p:extLst>
+  </p:cSld>
+  <p:clrMapOvr>
+    <a:masterClrMapping/>
+  </p:clrMapOvr>
+</p:sld>
+</file>
+
+<file path=ppt/slides/slide8.xml><?xml version="1.0" encoding="utf-8"?>
+<p:sld xmlns:a="http://schemas.openxmlformats.org/drawingml/2006/main" xmlns:r="http://schemas.openxmlformats.org/officeDocument/2006/relationships" xmlns:p="http://schemas.openxmlformats.org/presentationml/2006/main">
+  <p:cSld>
+    <p:spTree>
+      <p:nvGrpSpPr>
+        <p:cNvPr id="1" name=""/>
+        <p:cNvGrpSpPr/>
+        <p:nvPr/>
+      </p:nvGrpSpPr>
+      <p:grpSpPr>
+        <a:xfrm>
+          <a:off x="0" y="0"/>
+          <a:ext cx="0" cy="0"/>
+          <a:chOff x="0" y="0"/>
+          <a:chExt cx="0" cy="0"/>
+        </a:xfrm>
+      </p:grpSpPr>
+      <p:pic>
+        <p:nvPicPr>
+          <p:cNvPr id="3" name="Picture 2">
+            <a:extLst>
+              <a:ext uri="{FF2B5EF4-FFF2-40B4-BE49-F238E27FC236}">
+                <a16:creationId xmlns:a16="http://schemas.microsoft.com/office/drawing/2014/main" id="{1A89DA5D-E0FF-468D-A470-F06B6EC1C5E4}"/>
+              </a:ext>
+            </a:extLst>
+          </p:cNvPr>
+          <p:cNvPicPr>
+            <a:picLocks noChangeAspect="1"/>
+          </p:cNvPicPr>
+          <p:nvPr/>
+        </p:nvPicPr>
+        <p:blipFill>
+          <a:blip r:embed="rId2"/>
+          <a:stretch>
+            <a:fillRect/>
+          </a:stretch>
+        </p:blipFill>
+        <p:spPr>
+          <a:xfrm>
+            <a:off x="3176347" y="0"/>
+            <a:ext cx="5839305" cy="6858000"/>
+          </a:xfrm>
+          <a:prstGeom prst="rect">
+            <a:avLst/>
+          </a:prstGeom>
+        </p:spPr>
+      </p:pic>
+      <p:sp>
+        <p:nvSpPr>
+          <p:cNvPr id="4" name="Callout: Line 3">
+            <a:extLst>
+              <a:ext uri="{FF2B5EF4-FFF2-40B4-BE49-F238E27FC236}">
+                <a16:creationId xmlns:a16="http://schemas.microsoft.com/office/drawing/2014/main" id="{5C7410C8-6FFD-46B2-9E18-E3A5FB4672EA}"/>
+              </a:ext>
+            </a:extLst>
+          </p:cNvPr>
+          <p:cNvSpPr/>
+          <p:nvPr/>
+        </p:nvSpPr>
+        <p:spPr>
+          <a:xfrm>
+            <a:off x="75501" y="763435"/>
+            <a:ext cx="3040526" cy="1096841"/>
+          </a:xfrm>
+          <a:prstGeom prst="borderCallout1">
+            <a:avLst>
+              <a:gd name="adj1" fmla="val -3831"/>
+              <a:gd name="adj2" fmla="val 45805"/>
+              <a:gd name="adj3" fmla="val 10520"/>
+              <a:gd name="adj4" fmla="val 116481"/>
+            </a:avLst>
+          </a:prstGeom>
+          <a:solidFill>
+            <a:schemeClr val="accent4">
+              <a:lumMod val="40000"/>
+              <a:lumOff val="60000"/>
+            </a:schemeClr>
+          </a:solidFill>
+        </p:spPr>
+        <p:style>
+          <a:lnRef idx="2">
+            <a:schemeClr val="accent1">
+              <a:shade val="50000"/>
+            </a:schemeClr>
+          </a:lnRef>
+          <a:fillRef idx="1">
+            <a:schemeClr val="accent1"/>
+          </a:fillRef>
+          <a:effectRef idx="0">
+            <a:schemeClr val="accent1"/>
+          </a:effectRef>
+          <a:fontRef idx="minor">
+            <a:schemeClr val="lt1"/>
+          </a:fontRef>
+        </p:style>
+        <p:txBody>
+          <a:bodyPr rtlCol="0" anchor="ctr"/>
+          <a:lstStyle/>
+          <a:p>
+            <a:pPr algn="ctr"/>
+            <a:r>
+              <a:rPr lang="en-GB" dirty="0">
+                <a:solidFill>
+                  <a:schemeClr val="tx1"/>
+                </a:solidFill>
+              </a:rPr>
+              <a:t>We want this to be enabled so that any CI build produced from the </a:t>
+            </a:r>
+            <a:r>
+              <a:rPr lang="en-GB" b="1" dirty="0">
+                <a:solidFill>
+                  <a:schemeClr val="tx1"/>
+                </a:solidFill>
+              </a:rPr>
+              <a:t>master</a:t>
+            </a:r>
+            <a:r>
+              <a:rPr lang="en-GB" dirty="0">
+                <a:solidFill>
+                  <a:schemeClr val="tx1"/>
+                </a:solidFill>
+              </a:rPr>
+              <a:t> branch triggers the CD</a:t>
+            </a:r>
+          </a:p>
+        </p:txBody>
+      </p:sp>
+      <p:sp>
+        <p:nvSpPr>
+          <p:cNvPr id="5" name="Callout: Line 4">
+            <a:extLst>
+              <a:ext uri="{FF2B5EF4-FFF2-40B4-BE49-F238E27FC236}">
+                <a16:creationId xmlns:a16="http://schemas.microsoft.com/office/drawing/2014/main" id="{EDA9E9BC-D1AD-49A2-A8C5-9C7D25BBDF84}"/>
+              </a:ext>
+            </a:extLst>
+          </p:cNvPr>
+          <p:cNvSpPr/>
+          <p:nvPr/>
+        </p:nvSpPr>
+        <p:spPr>
+          <a:xfrm>
+            <a:off x="135821" y="4997724"/>
+            <a:ext cx="3040526" cy="780176"/>
+          </a:xfrm>
+          <a:prstGeom prst="borderCallout1">
+            <a:avLst>
+              <a:gd name="adj1" fmla="val -3831"/>
+              <a:gd name="adj2" fmla="val 45805"/>
+              <a:gd name="adj3" fmla="val -169090"/>
+              <a:gd name="adj4" fmla="val 111515"/>
+            </a:avLst>
+          </a:prstGeom>
+          <a:solidFill>
+            <a:schemeClr val="accent4">
+              <a:lumMod val="40000"/>
+              <a:lumOff val="60000"/>
+            </a:schemeClr>
+          </a:solidFill>
+        </p:spPr>
+        <p:style>
+          <a:lnRef idx="2">
+            <a:schemeClr val="accent1">
+              <a:shade val="50000"/>
+            </a:schemeClr>
+          </a:lnRef>
+          <a:fillRef idx="1">
+            <a:schemeClr val="accent1"/>
+          </a:fillRef>
+          <a:effectRef idx="0">
+            <a:schemeClr val="accent1"/>
+          </a:effectRef>
+          <a:fontRef idx="minor">
+            <a:schemeClr val="lt1"/>
+          </a:fontRef>
+        </p:style>
+        <p:txBody>
+          <a:bodyPr rtlCol="0" anchor="ctr"/>
+          <a:lstStyle/>
+          <a:p>
+            <a:pPr algn="ctr"/>
+            <a:r>
+              <a:rPr lang="en-GB" dirty="0">
+                <a:solidFill>
+                  <a:schemeClr val="tx1"/>
+                </a:solidFill>
+              </a:rPr>
+              <a:t>We want this to be enabled so that any CI build produced by a </a:t>
+            </a:r>
+            <a:r>
+              <a:rPr lang="en-GB" b="1" dirty="0">
+                <a:solidFill>
+                  <a:schemeClr val="tx1"/>
+                </a:solidFill>
+              </a:rPr>
+              <a:t>PR</a:t>
+            </a:r>
+            <a:r>
+              <a:rPr lang="en-GB" dirty="0">
+                <a:solidFill>
+                  <a:schemeClr val="tx1"/>
+                </a:solidFill>
+              </a:rPr>
+              <a:t> branch triggers the CD</a:t>
+            </a:r>
+          </a:p>
+        </p:txBody>
+      </p:sp>
+      <p:pic>
+        <p:nvPicPr>
+          <p:cNvPr id="7" name="Picture 6">
+            <a:extLst>
+              <a:ext uri="{FF2B5EF4-FFF2-40B4-BE49-F238E27FC236}">
+                <a16:creationId xmlns:a16="http://schemas.microsoft.com/office/drawing/2014/main" id="{085D72F9-388A-4AC1-8043-911BCC705E93}"/>
+              </a:ext>
+            </a:extLst>
+          </p:cNvPr>
+          <p:cNvPicPr>
+            <a:picLocks noChangeAspect="1"/>
+          </p:cNvPicPr>
+          <p:nvPr/>
+        </p:nvPicPr>
+        <p:blipFill>
+          <a:blip r:embed="rId3"/>
+          <a:stretch>
+            <a:fillRect/>
+          </a:stretch>
+        </p:blipFill>
+        <p:spPr>
+          <a:xfrm>
+            <a:off x="179622" y="2399250"/>
+            <a:ext cx="2047875" cy="2295525"/>
+          </a:xfrm>
+          <a:prstGeom prst="rect">
+            <a:avLst/>
+          </a:prstGeom>
+        </p:spPr>
+      </p:pic>
+      <p:sp>
+        <p:nvSpPr>
+          <p:cNvPr id="8" name="Callout: Line 7">
+            <a:extLst>
+              <a:ext uri="{FF2B5EF4-FFF2-40B4-BE49-F238E27FC236}">
+                <a16:creationId xmlns:a16="http://schemas.microsoft.com/office/drawing/2014/main" id="{E939022B-0623-4B31-B827-F52216344F0B}"/>
+              </a:ext>
+            </a:extLst>
+          </p:cNvPr>
+          <p:cNvSpPr/>
+          <p:nvPr/>
+        </p:nvSpPr>
+        <p:spPr>
+          <a:xfrm>
+            <a:off x="9151474" y="2648824"/>
+            <a:ext cx="3040526" cy="780176"/>
+          </a:xfrm>
+          <a:prstGeom prst="borderCallout1">
+            <a:avLst>
+              <a:gd name="adj1" fmla="val -3831"/>
+              <a:gd name="adj2" fmla="val 45805"/>
+              <a:gd name="adj3" fmla="val 135211"/>
+              <a:gd name="adj4" fmla="val -245231"/>
+            </a:avLst>
+          </a:prstGeom>
+          <a:solidFill>
+            <a:schemeClr val="accent4">
+              <a:lumMod val="40000"/>
+              <a:lumOff val="60000"/>
+            </a:schemeClr>
+          </a:solidFill>
+        </p:spPr>
+        <p:style>
+          <a:lnRef idx="2">
+            <a:schemeClr val="accent1">
+              <a:shade val="50000"/>
+            </a:schemeClr>
+          </a:lnRef>
+          <a:fillRef idx="1">
+            <a:schemeClr val="accent1"/>
+          </a:fillRef>
+          <a:effectRef idx="0">
+            <a:schemeClr val="accent1"/>
+          </a:effectRef>
+          <a:fontRef idx="minor">
+            <a:schemeClr val="lt1"/>
+          </a:fontRef>
+        </p:style>
+        <p:txBody>
+          <a:bodyPr rtlCol="0" anchor="ctr"/>
+          <a:lstStyle/>
+          <a:p>
+            <a:pPr algn="ctr"/>
+            <a:r>
+              <a:rPr lang="en-GB" dirty="0">
+                <a:solidFill>
+                  <a:schemeClr val="tx1"/>
+                </a:solidFill>
+              </a:rPr>
+              <a:t>Click here to define what triggers this </a:t>
+            </a:r>
+            <a:r>
+              <a:rPr lang="en-GB" b="1" dirty="0">
+                <a:solidFill>
+                  <a:schemeClr val="tx1"/>
+                </a:solidFill>
+              </a:rPr>
+              <a:t>CD</a:t>
+            </a:r>
+            <a:r>
+              <a:rPr lang="en-GB" dirty="0">
+                <a:solidFill>
+                  <a:schemeClr val="tx1"/>
+                </a:solidFill>
+              </a:rPr>
+              <a:t> pipeline</a:t>
+            </a:r>
+          </a:p>
+        </p:txBody>
+      </p:sp>
+    </p:spTree>
+    <p:extLst>
+      <p:ext uri="{BB962C8B-B14F-4D97-AF65-F5344CB8AC3E}">
+        <p14:creationId xmlns:p14="http://schemas.microsoft.com/office/powerpoint/2010/main" val="4248355410"/>
+      </p:ext>
+    </p:extLst>
+  </p:cSld>
+  <p:clrMapOvr>
+    <a:masterClrMapping/>
+  </p:clrMapOvr>
+</p:sld>
+</file>
+
+<file path=ppt/slides/slide9.xml><?xml version="1.0" encoding="utf-8"?>
+<p:sld xmlns:a="http://schemas.openxmlformats.org/drawingml/2006/main" xmlns:r="http://schemas.openxmlformats.org/officeDocument/2006/relationships" xmlns:p="http://schemas.openxmlformats.org/presentationml/2006/main">
+  <p:cSld>
+    <p:spTree>
+      <p:nvGrpSpPr>
+        <p:cNvPr id="1" name=""/>
+        <p:cNvGrpSpPr/>
+        <p:nvPr/>
+      </p:nvGrpSpPr>
+      <p:grpSpPr>
+        <a:xfrm>
+          <a:off x="0" y="0"/>
+          <a:ext cx="0" cy="0"/>
+          <a:chOff x="0" y="0"/>
+          <a:chExt cx="0" cy="0"/>
+        </a:xfrm>
+      </p:grpSpPr>
+      <p:pic>
+        <p:nvPicPr>
+          <p:cNvPr id="3" name="Picture 2">
+            <a:extLst>
+              <a:ext uri="{FF2B5EF4-FFF2-40B4-BE49-F238E27FC236}">
+                <a16:creationId xmlns:a16="http://schemas.microsoft.com/office/drawing/2014/main" id="{A689571B-8883-4369-A815-117254E38ADE}"/>
+              </a:ext>
+            </a:extLst>
+          </p:cNvPr>
+          <p:cNvPicPr>
+            <a:picLocks noChangeAspect="1"/>
+          </p:cNvPicPr>
+          <p:nvPr/>
+        </p:nvPicPr>
+        <p:blipFill>
+          <a:blip r:embed="rId2"/>
+          <a:stretch>
+            <a:fillRect/>
+          </a:stretch>
+        </p:blipFill>
+        <p:spPr>
+          <a:xfrm>
+            <a:off x="424967" y="108499"/>
+            <a:ext cx="4751887" cy="3389709"/>
+          </a:xfrm>
+          <a:prstGeom prst="rect">
+            <a:avLst/>
+          </a:prstGeom>
+        </p:spPr>
+      </p:pic>
+      <p:pic>
+        <p:nvPicPr>
+          <p:cNvPr id="5" name="Picture 4">
+            <a:extLst>
+              <a:ext uri="{FF2B5EF4-FFF2-40B4-BE49-F238E27FC236}">
+                <a16:creationId xmlns:a16="http://schemas.microsoft.com/office/drawing/2014/main" id="{4457342F-5A4E-4D8A-BED0-166B0C2C26B6}"/>
+              </a:ext>
+            </a:extLst>
+          </p:cNvPr>
+          <p:cNvPicPr>
+            <a:picLocks noChangeAspect="1"/>
+          </p:cNvPicPr>
+          <p:nvPr/>
+        </p:nvPicPr>
+        <p:blipFill>
+          <a:blip r:embed="rId3"/>
+          <a:stretch>
+            <a:fillRect/>
+          </a:stretch>
+        </p:blipFill>
+        <p:spPr>
+          <a:xfrm>
+            <a:off x="6368091" y="151843"/>
+            <a:ext cx="4126537" cy="3303020"/>
+          </a:xfrm>
+          <a:prstGeom prst="rect">
+            <a:avLst/>
+          </a:prstGeom>
+        </p:spPr>
+      </p:pic>
+      <p:sp>
+        <p:nvSpPr>
+          <p:cNvPr id="6" name="Callout: Line 5">
+            <a:extLst>
+              <a:ext uri="{FF2B5EF4-FFF2-40B4-BE49-F238E27FC236}">
+                <a16:creationId xmlns:a16="http://schemas.microsoft.com/office/drawing/2014/main" id="{38D4ED2E-CD8A-476C-AD57-F8FD16564CE9}"/>
+              </a:ext>
+            </a:extLst>
+          </p:cNvPr>
+          <p:cNvSpPr/>
+          <p:nvPr/>
+        </p:nvSpPr>
+        <p:spPr>
+          <a:xfrm>
+            <a:off x="127432" y="4915233"/>
+            <a:ext cx="3278498" cy="780176"/>
+          </a:xfrm>
+          <a:prstGeom prst="borderCallout1">
+            <a:avLst>
+              <a:gd name="adj1" fmla="val -3831"/>
+              <a:gd name="adj2" fmla="val 45805"/>
+              <a:gd name="adj3" fmla="val -407800"/>
+              <a:gd name="adj4" fmla="val 84336"/>
+            </a:avLst>
+          </a:prstGeom>
+          <a:solidFill>
+            <a:schemeClr val="accent4">
+              <a:lumMod val="40000"/>
+              <a:lumOff val="60000"/>
+            </a:schemeClr>
+          </a:solidFill>
+        </p:spPr>
+        <p:style>
+          <a:lnRef idx="2">
+            <a:schemeClr val="accent1">
+              <a:shade val="50000"/>
+            </a:schemeClr>
+          </a:lnRef>
+          <a:fillRef idx="1">
+            <a:schemeClr val="accent1"/>
+          </a:fillRef>
+          <a:effectRef idx="0">
+            <a:schemeClr val="accent1"/>
+          </a:effectRef>
+          <a:fontRef idx="minor">
+            <a:schemeClr val="lt1"/>
+          </a:fontRef>
+        </p:style>
+        <p:txBody>
+          <a:bodyPr rtlCol="0" anchor="ctr"/>
+          <a:lstStyle/>
+          <a:p>
+            <a:pPr algn="ctr"/>
+            <a:r>
+              <a:rPr lang="en-GB" dirty="0">
+                <a:solidFill>
+                  <a:schemeClr val="tx1"/>
+                </a:solidFill>
+              </a:rPr>
+              <a:t>We specify here that </a:t>
+            </a:r>
+            <a:r>
+              <a:rPr lang="en-GB" b="1" dirty="0">
+                <a:solidFill>
+                  <a:schemeClr val="tx1"/>
+                </a:solidFill>
+              </a:rPr>
+              <a:t>UAT</a:t>
+            </a:r>
+            <a:r>
+              <a:rPr lang="en-GB" dirty="0">
+                <a:solidFill>
+                  <a:schemeClr val="tx1"/>
+                </a:solidFill>
+              </a:rPr>
+              <a:t> stage runs only after </a:t>
+            </a:r>
+            <a:r>
+              <a:rPr lang="en-GB" b="1" dirty="0">
+                <a:solidFill>
+                  <a:schemeClr val="tx1"/>
+                </a:solidFill>
+              </a:rPr>
+              <a:t>DEV</a:t>
+            </a:r>
+            <a:r>
+              <a:rPr lang="en-GB" dirty="0">
+                <a:solidFill>
+                  <a:schemeClr val="tx1"/>
+                </a:solidFill>
+              </a:rPr>
+              <a:t> stage</a:t>
+            </a:r>
+          </a:p>
+          <a:p>
+            <a:pPr algn="ctr"/>
+            <a:endParaRPr lang="en-GB" dirty="0">
+              <a:solidFill>
+                <a:schemeClr val="tx1"/>
+              </a:solidFill>
+            </a:endParaRPr>
+          </a:p>
+        </p:txBody>
+      </p:sp>
+      <p:sp>
+        <p:nvSpPr>
+          <p:cNvPr id="7" name="Callout: Line 6">
+            <a:extLst>
+              <a:ext uri="{FF2B5EF4-FFF2-40B4-BE49-F238E27FC236}">
+                <a16:creationId xmlns:a16="http://schemas.microsoft.com/office/drawing/2014/main" id="{E6B2E727-6955-4A2A-B157-40C96D9C7A8E}"/>
+              </a:ext>
+            </a:extLst>
+          </p:cNvPr>
+          <p:cNvSpPr/>
+          <p:nvPr/>
+        </p:nvSpPr>
+        <p:spPr>
+          <a:xfrm>
+            <a:off x="6462518" y="4915233"/>
+            <a:ext cx="3040526" cy="780176"/>
+          </a:xfrm>
+          <a:prstGeom prst="borderCallout1">
+            <a:avLst>
+              <a:gd name="adj1" fmla="val -3831"/>
+              <a:gd name="adj2" fmla="val 45805"/>
+              <a:gd name="adj3" fmla="val -472316"/>
+              <a:gd name="adj4" fmla="val 71233"/>
+            </a:avLst>
+          </a:prstGeom>
+          <a:solidFill>
+            <a:schemeClr val="accent4">
+              <a:lumMod val="40000"/>
+              <a:lumOff val="60000"/>
+            </a:schemeClr>
+          </a:solidFill>
+        </p:spPr>
+        <p:style>
+          <a:lnRef idx="2">
+            <a:schemeClr val="accent1">
+              <a:shade val="50000"/>
+            </a:schemeClr>
+          </a:lnRef>
+          <a:fillRef idx="1">
+            <a:schemeClr val="accent1"/>
+          </a:fillRef>
+          <a:effectRef idx="0">
+            <a:schemeClr val="accent1"/>
+          </a:effectRef>
+          <a:fontRef idx="minor">
+            <a:schemeClr val="lt1"/>
+          </a:fontRef>
+        </p:style>
+        <p:txBody>
+          <a:bodyPr rtlCol="0" anchor="ctr"/>
+          <a:lstStyle/>
+          <a:p>
+            <a:pPr algn="ctr"/>
+            <a:r>
+              <a:rPr lang="en-GB" dirty="0">
+                <a:solidFill>
+                  <a:schemeClr val="tx1"/>
+                </a:solidFill>
+              </a:rPr>
+              <a:t>We specify here that </a:t>
+            </a:r>
+            <a:r>
+              <a:rPr lang="en-GB" b="1" dirty="0">
+                <a:solidFill>
+                  <a:schemeClr val="tx1"/>
+                </a:solidFill>
+              </a:rPr>
+              <a:t>PROD</a:t>
+            </a:r>
+            <a:r>
+              <a:rPr lang="en-GB" dirty="0">
+                <a:solidFill>
+                  <a:schemeClr val="tx1"/>
+                </a:solidFill>
+              </a:rPr>
+              <a:t> stage runs only after </a:t>
+            </a:r>
+            <a:r>
+              <a:rPr lang="en-GB" b="1" dirty="0">
+                <a:solidFill>
+                  <a:schemeClr val="tx1"/>
+                </a:solidFill>
+              </a:rPr>
+              <a:t>UAT</a:t>
+            </a:r>
+            <a:r>
+              <a:rPr lang="en-GB" dirty="0">
+                <a:solidFill>
+                  <a:schemeClr val="tx1"/>
+                </a:solidFill>
+              </a:rPr>
+              <a:t> stage</a:t>
+            </a:r>
+          </a:p>
+        </p:txBody>
+      </p:sp>
+    </p:spTree>
+    <p:extLst>
+      <p:ext uri="{BB962C8B-B14F-4D97-AF65-F5344CB8AC3E}">
+        <p14:creationId xmlns:p14="http://schemas.microsoft.com/office/powerpoint/2010/main" val="4280305944"/>
       </p:ext>
     </p:extLst>
   </p:cSld>

</xml_diff>

<commit_message>
How do we structure our assets on the Azure cloud
</commit_message>
<xml_diff>
--- a/DemoWebAppWithCiCd/docs/cicd.pptx
+++ b/DemoWebAppWithCiCd/docs/cicd.pptx
@@ -15,6 +15,9 @@
     <p:sldId id="263" r:id="rId9"/>
     <p:sldId id="264" r:id="rId10"/>
     <p:sldId id="265" r:id="rId11"/>
+    <p:sldId id="266" r:id="rId12"/>
+    <p:sldId id="267" r:id="rId13"/>
+    <p:sldId id="268" r:id="rId14"/>
   </p:sldIdLst>
   <p:sldSz cx="12192000" cy="6858000"/>
   <p:notesSz cx="6858000" cy="9144000"/>
@@ -3655,6 +3658,530 @@
 </p:sld>
 </file>
 
+<file path=ppt/slides/slide11.xml><?xml version="1.0" encoding="utf-8"?>
+<p:sld xmlns:a="http://schemas.openxmlformats.org/drawingml/2006/main" xmlns:r="http://schemas.openxmlformats.org/officeDocument/2006/relationships" xmlns:p="http://schemas.openxmlformats.org/presentationml/2006/main">
+  <p:cSld>
+    <p:spTree>
+      <p:nvGrpSpPr>
+        <p:cNvPr id="1" name=""/>
+        <p:cNvGrpSpPr/>
+        <p:nvPr/>
+      </p:nvGrpSpPr>
+      <p:grpSpPr>
+        <a:xfrm>
+          <a:off x="0" y="0"/>
+          <a:ext cx="0" cy="0"/>
+          <a:chOff x="0" y="0"/>
+          <a:chExt cx="0" cy="0"/>
+        </a:xfrm>
+      </p:grpSpPr>
+      <p:pic>
+        <p:nvPicPr>
+          <p:cNvPr id="5" name="Picture 4">
+            <a:extLst>
+              <a:ext uri="{FF2B5EF4-FFF2-40B4-BE49-F238E27FC236}">
+                <a16:creationId xmlns:a16="http://schemas.microsoft.com/office/drawing/2014/main" id="{EFD963A9-A47F-4E9F-A844-4D8FE136817E}"/>
+              </a:ext>
+            </a:extLst>
+          </p:cNvPr>
+          <p:cNvPicPr>
+            <a:picLocks noChangeAspect="1"/>
+          </p:cNvPicPr>
+          <p:nvPr/>
+        </p:nvPicPr>
+        <p:blipFill>
+          <a:blip r:embed="rId2"/>
+          <a:stretch>
+            <a:fillRect/>
+          </a:stretch>
+        </p:blipFill>
+        <p:spPr>
+          <a:xfrm>
+            <a:off x="816615" y="213308"/>
+            <a:ext cx="9048750" cy="5391150"/>
+          </a:xfrm>
+          <a:prstGeom prst="rect">
+            <a:avLst/>
+          </a:prstGeom>
+        </p:spPr>
+      </p:pic>
+      <p:sp>
+        <p:nvSpPr>
+          <p:cNvPr id="6" name="Callout: Line 5">
+            <a:extLst>
+              <a:ext uri="{FF2B5EF4-FFF2-40B4-BE49-F238E27FC236}">
+                <a16:creationId xmlns:a16="http://schemas.microsoft.com/office/drawing/2014/main" id="{3EF13B64-3364-42D5-953A-8180ED8BD1E2}"/>
+              </a:ext>
+            </a:extLst>
+          </p:cNvPr>
+          <p:cNvSpPr/>
+          <p:nvPr/>
+        </p:nvSpPr>
+        <p:spPr>
+          <a:xfrm>
+            <a:off x="5789999" y="5922523"/>
+            <a:ext cx="4411012" cy="780176"/>
+          </a:xfrm>
+          <a:prstGeom prst="borderCallout1">
+            <a:avLst>
+              <a:gd name="adj1" fmla="val 47782"/>
+              <a:gd name="adj2" fmla="val -29"/>
+              <a:gd name="adj3" fmla="val -252962"/>
+              <a:gd name="adj4" fmla="val -41014"/>
+            </a:avLst>
+          </a:prstGeom>
+          <a:solidFill>
+            <a:schemeClr val="accent4">
+              <a:lumMod val="40000"/>
+              <a:lumOff val="60000"/>
+            </a:schemeClr>
+          </a:solidFill>
+        </p:spPr>
+        <p:style>
+          <a:lnRef idx="2">
+            <a:schemeClr val="accent1">
+              <a:shade val="50000"/>
+            </a:schemeClr>
+          </a:lnRef>
+          <a:fillRef idx="1">
+            <a:schemeClr val="accent1"/>
+          </a:fillRef>
+          <a:effectRef idx="0">
+            <a:schemeClr val="accent1"/>
+          </a:effectRef>
+          <a:fontRef idx="minor">
+            <a:schemeClr val="lt1"/>
+          </a:fontRef>
+        </p:style>
+        <p:txBody>
+          <a:bodyPr rtlCol="0" anchor="ctr"/>
+          <a:lstStyle/>
+          <a:p>
+            <a:pPr algn="ctr"/>
+            <a:r>
+              <a:rPr lang="en-GB" dirty="0">
+                <a:solidFill>
+                  <a:schemeClr val="tx1"/>
+                </a:solidFill>
+              </a:rPr>
+              <a:t>3 resource groups for </a:t>
+            </a:r>
+            <a:r>
+              <a:rPr lang="en-GB" b="1" dirty="0" err="1">
+                <a:solidFill>
+                  <a:schemeClr val="tx1"/>
+                </a:solidFill>
+              </a:rPr>
+              <a:t>BackEnd</a:t>
+            </a:r>
+            <a:r>
+              <a:rPr lang="en-GB" b="1" dirty="0">
+                <a:solidFill>
+                  <a:schemeClr val="tx1"/>
+                </a:solidFill>
+              </a:rPr>
+              <a:t> </a:t>
+            </a:r>
+            <a:r>
+              <a:rPr lang="en-GB" dirty="0">
+                <a:solidFill>
+                  <a:schemeClr val="tx1"/>
+                </a:solidFill>
+              </a:rPr>
+              <a:t>deployments</a:t>
+            </a:r>
+          </a:p>
+        </p:txBody>
+      </p:sp>
+      <p:sp>
+        <p:nvSpPr>
+          <p:cNvPr id="7" name="Callout: Line 6">
+            <a:extLst>
+              <a:ext uri="{FF2B5EF4-FFF2-40B4-BE49-F238E27FC236}">
+                <a16:creationId xmlns:a16="http://schemas.microsoft.com/office/drawing/2014/main" id="{DCD03673-FB93-42DF-A1E7-A3771774EF0E}"/>
+              </a:ext>
+            </a:extLst>
+          </p:cNvPr>
+          <p:cNvSpPr/>
+          <p:nvPr/>
+        </p:nvSpPr>
+        <p:spPr>
+          <a:xfrm>
+            <a:off x="1142499" y="5938638"/>
+            <a:ext cx="4411012" cy="780176"/>
+          </a:xfrm>
+          <a:prstGeom prst="borderCallout1">
+            <a:avLst>
+              <a:gd name="adj1" fmla="val 47782"/>
+              <a:gd name="adj2" fmla="val -29"/>
+              <a:gd name="adj3" fmla="val -51887"/>
+              <a:gd name="adj4" fmla="val 3299"/>
+            </a:avLst>
+          </a:prstGeom>
+          <a:solidFill>
+            <a:schemeClr val="accent4">
+              <a:lumMod val="40000"/>
+              <a:lumOff val="60000"/>
+            </a:schemeClr>
+          </a:solidFill>
+        </p:spPr>
+        <p:style>
+          <a:lnRef idx="2">
+            <a:schemeClr val="accent1">
+              <a:shade val="50000"/>
+            </a:schemeClr>
+          </a:lnRef>
+          <a:fillRef idx="1">
+            <a:schemeClr val="accent1"/>
+          </a:fillRef>
+          <a:effectRef idx="0">
+            <a:schemeClr val="accent1"/>
+          </a:effectRef>
+          <a:fontRef idx="minor">
+            <a:schemeClr val="lt1"/>
+          </a:fontRef>
+        </p:style>
+        <p:txBody>
+          <a:bodyPr rtlCol="0" anchor="ctr"/>
+          <a:lstStyle/>
+          <a:p>
+            <a:pPr algn="ctr"/>
+            <a:r>
+              <a:rPr lang="en-GB" dirty="0">
+                <a:solidFill>
+                  <a:schemeClr val="tx1"/>
+                </a:solidFill>
+              </a:rPr>
+              <a:t>3 resource groups for </a:t>
+            </a:r>
+            <a:r>
+              <a:rPr lang="en-GB" b="1" dirty="0" err="1">
+                <a:solidFill>
+                  <a:schemeClr val="tx1"/>
+                </a:solidFill>
+              </a:rPr>
+              <a:t>FrontEnd</a:t>
+            </a:r>
+            <a:r>
+              <a:rPr lang="en-GB" b="1" dirty="0">
+                <a:solidFill>
+                  <a:schemeClr val="tx1"/>
+                </a:solidFill>
+              </a:rPr>
+              <a:t> </a:t>
+            </a:r>
+            <a:r>
+              <a:rPr lang="en-GB" dirty="0">
+                <a:solidFill>
+                  <a:schemeClr val="tx1"/>
+                </a:solidFill>
+              </a:rPr>
+              <a:t>deployments</a:t>
+            </a:r>
+          </a:p>
+        </p:txBody>
+      </p:sp>
+    </p:spTree>
+    <p:extLst>
+      <p:ext uri="{BB962C8B-B14F-4D97-AF65-F5344CB8AC3E}">
+        <p14:creationId xmlns:p14="http://schemas.microsoft.com/office/powerpoint/2010/main" val="1105868243"/>
+      </p:ext>
+    </p:extLst>
+  </p:cSld>
+  <p:clrMapOvr>
+    <a:masterClrMapping/>
+  </p:clrMapOvr>
+</p:sld>
+</file>
+
+<file path=ppt/slides/slide12.xml><?xml version="1.0" encoding="utf-8"?>
+<p:sld xmlns:a="http://schemas.openxmlformats.org/drawingml/2006/main" xmlns:r="http://schemas.openxmlformats.org/officeDocument/2006/relationships" xmlns:p="http://schemas.openxmlformats.org/presentationml/2006/main">
+  <p:cSld>
+    <p:spTree>
+      <p:nvGrpSpPr>
+        <p:cNvPr id="1" name=""/>
+        <p:cNvGrpSpPr/>
+        <p:nvPr/>
+      </p:nvGrpSpPr>
+      <p:grpSpPr>
+        <a:xfrm>
+          <a:off x="0" y="0"/>
+          <a:ext cx="0" cy="0"/>
+          <a:chOff x="0" y="0"/>
+          <a:chExt cx="0" cy="0"/>
+        </a:xfrm>
+      </p:grpSpPr>
+      <p:pic>
+        <p:nvPicPr>
+          <p:cNvPr id="6" name="Picture 5">
+            <a:extLst>
+              <a:ext uri="{FF2B5EF4-FFF2-40B4-BE49-F238E27FC236}">
+                <a16:creationId xmlns:a16="http://schemas.microsoft.com/office/drawing/2014/main" id="{B137C90C-62DE-45EC-B8DA-D52EC7F1EE14}"/>
+              </a:ext>
+            </a:extLst>
+          </p:cNvPr>
+          <p:cNvPicPr>
+            <a:picLocks noChangeAspect="1"/>
+          </p:cNvPicPr>
+          <p:nvPr/>
+        </p:nvPicPr>
+        <p:blipFill>
+          <a:blip r:embed="rId2"/>
+          <a:stretch>
+            <a:fillRect/>
+          </a:stretch>
+        </p:blipFill>
+        <p:spPr>
+          <a:xfrm>
+            <a:off x="0" y="888676"/>
+            <a:ext cx="12192000" cy="5080648"/>
+          </a:xfrm>
+          <a:prstGeom prst="rect">
+            <a:avLst/>
+          </a:prstGeom>
+        </p:spPr>
+      </p:pic>
+      <p:sp>
+        <p:nvSpPr>
+          <p:cNvPr id="7" name="Callout: Line 6">
+            <a:extLst>
+              <a:ext uri="{FF2B5EF4-FFF2-40B4-BE49-F238E27FC236}">
+                <a16:creationId xmlns:a16="http://schemas.microsoft.com/office/drawing/2014/main" id="{F007934E-E9F3-421B-88EF-052BCF51093D}"/>
+              </a:ext>
+            </a:extLst>
+          </p:cNvPr>
+          <p:cNvSpPr/>
+          <p:nvPr/>
+        </p:nvSpPr>
+        <p:spPr>
+          <a:xfrm>
+            <a:off x="5789999" y="5922523"/>
+            <a:ext cx="4411012" cy="780176"/>
+          </a:xfrm>
+          <a:prstGeom prst="borderCallout1">
+            <a:avLst>
+              <a:gd name="adj1" fmla="val 47782"/>
+              <a:gd name="adj2" fmla="val -29"/>
+              <a:gd name="adj3" fmla="val -58338"/>
+              <a:gd name="adj4" fmla="val -68781"/>
+            </a:avLst>
+          </a:prstGeom>
+          <a:solidFill>
+            <a:schemeClr val="accent4">
+              <a:lumMod val="40000"/>
+              <a:lumOff val="60000"/>
+            </a:schemeClr>
+          </a:solidFill>
+        </p:spPr>
+        <p:style>
+          <a:lnRef idx="2">
+            <a:schemeClr val="accent1">
+              <a:shade val="50000"/>
+            </a:schemeClr>
+          </a:lnRef>
+          <a:fillRef idx="1">
+            <a:schemeClr val="accent1"/>
+          </a:fillRef>
+          <a:effectRef idx="0">
+            <a:schemeClr val="accent1"/>
+          </a:effectRef>
+          <a:fontRef idx="minor">
+            <a:schemeClr val="lt1"/>
+          </a:fontRef>
+        </p:style>
+        <p:txBody>
+          <a:bodyPr rtlCol="0" anchor="ctr"/>
+          <a:lstStyle/>
+          <a:p>
+            <a:pPr algn="ctr"/>
+            <a:r>
+              <a:rPr lang="en-GB" b="1" dirty="0">
+                <a:solidFill>
+                  <a:schemeClr val="tx1"/>
+                </a:solidFill>
+              </a:rPr>
+              <a:t>App service plan</a:t>
+            </a:r>
+            <a:r>
+              <a:rPr lang="en-GB" dirty="0">
+                <a:solidFill>
+                  <a:schemeClr val="tx1"/>
+                </a:solidFill>
+              </a:rPr>
+              <a:t> and the an </a:t>
+            </a:r>
+            <a:r>
+              <a:rPr lang="en-GB" b="1" dirty="0">
+                <a:solidFill>
+                  <a:schemeClr val="tx1"/>
+                </a:solidFill>
+              </a:rPr>
+              <a:t>App service</a:t>
+            </a:r>
+            <a:r>
+              <a:rPr lang="en-GB" dirty="0">
+                <a:solidFill>
+                  <a:schemeClr val="tx1"/>
+                </a:solidFill>
+              </a:rPr>
+              <a:t> which uses the plan</a:t>
+            </a:r>
+          </a:p>
+        </p:txBody>
+      </p:sp>
+    </p:spTree>
+    <p:extLst>
+      <p:ext uri="{BB962C8B-B14F-4D97-AF65-F5344CB8AC3E}">
+        <p14:creationId xmlns:p14="http://schemas.microsoft.com/office/powerpoint/2010/main" val="2294613321"/>
+      </p:ext>
+    </p:extLst>
+  </p:cSld>
+  <p:clrMapOvr>
+    <a:masterClrMapping/>
+  </p:clrMapOvr>
+</p:sld>
+</file>
+
+<file path=ppt/slides/slide13.xml><?xml version="1.0" encoding="utf-8"?>
+<p:sld xmlns:a="http://schemas.openxmlformats.org/drawingml/2006/main" xmlns:r="http://schemas.openxmlformats.org/officeDocument/2006/relationships" xmlns:p="http://schemas.openxmlformats.org/presentationml/2006/main">
+  <p:cSld>
+    <p:spTree>
+      <p:nvGrpSpPr>
+        <p:cNvPr id="1" name=""/>
+        <p:cNvGrpSpPr/>
+        <p:nvPr/>
+      </p:nvGrpSpPr>
+      <p:grpSpPr>
+        <a:xfrm>
+          <a:off x="0" y="0"/>
+          <a:ext cx="0" cy="0"/>
+          <a:chOff x="0" y="0"/>
+          <a:chExt cx="0" cy="0"/>
+        </a:xfrm>
+      </p:grpSpPr>
+      <p:pic>
+        <p:nvPicPr>
+          <p:cNvPr id="3" name="Picture 2">
+            <a:extLst>
+              <a:ext uri="{FF2B5EF4-FFF2-40B4-BE49-F238E27FC236}">
+                <a16:creationId xmlns:a16="http://schemas.microsoft.com/office/drawing/2014/main" id="{C615E3A4-4DA9-42A9-B14B-9D3F7A253445}"/>
+              </a:ext>
+            </a:extLst>
+          </p:cNvPr>
+          <p:cNvPicPr>
+            <a:picLocks noChangeAspect="1"/>
+          </p:cNvPicPr>
+          <p:nvPr/>
+        </p:nvPicPr>
+        <p:blipFill>
+          <a:blip r:embed="rId2"/>
+          <a:stretch>
+            <a:fillRect/>
+          </a:stretch>
+        </p:blipFill>
+        <p:spPr>
+          <a:xfrm>
+            <a:off x="515923" y="1122557"/>
+            <a:ext cx="11160154" cy="4195443"/>
+          </a:xfrm>
+          <a:prstGeom prst="rect">
+            <a:avLst/>
+          </a:prstGeom>
+        </p:spPr>
+      </p:pic>
+      <p:sp>
+        <p:nvSpPr>
+          <p:cNvPr id="4" name="Callout: Line 3">
+            <a:extLst>
+              <a:ext uri="{FF2B5EF4-FFF2-40B4-BE49-F238E27FC236}">
+                <a16:creationId xmlns:a16="http://schemas.microsoft.com/office/drawing/2014/main" id="{32D45009-AA09-4655-9F0B-E4B47FAD1AD4}"/>
+              </a:ext>
+            </a:extLst>
+          </p:cNvPr>
+          <p:cNvSpPr/>
+          <p:nvPr/>
+        </p:nvSpPr>
+        <p:spPr>
+          <a:xfrm>
+            <a:off x="5789999" y="5922523"/>
+            <a:ext cx="4411012" cy="780176"/>
+          </a:xfrm>
+          <a:prstGeom prst="borderCallout1">
+            <a:avLst>
+              <a:gd name="adj1" fmla="val 47782"/>
+              <a:gd name="adj2" fmla="val -29"/>
+              <a:gd name="adj3" fmla="val -99199"/>
+              <a:gd name="adj4" fmla="val -74676"/>
+            </a:avLst>
+          </a:prstGeom>
+          <a:solidFill>
+            <a:schemeClr val="accent4">
+              <a:lumMod val="40000"/>
+              <a:lumOff val="60000"/>
+            </a:schemeClr>
+          </a:solidFill>
+        </p:spPr>
+        <p:style>
+          <a:lnRef idx="2">
+            <a:schemeClr val="accent1">
+              <a:shade val="50000"/>
+            </a:schemeClr>
+          </a:lnRef>
+          <a:fillRef idx="1">
+            <a:schemeClr val="accent1"/>
+          </a:fillRef>
+          <a:effectRef idx="0">
+            <a:schemeClr val="accent1"/>
+          </a:effectRef>
+          <a:fontRef idx="minor">
+            <a:schemeClr val="lt1"/>
+          </a:fontRef>
+        </p:style>
+        <p:txBody>
+          <a:bodyPr rtlCol="0" anchor="ctr"/>
+          <a:lstStyle/>
+          <a:p>
+            <a:pPr algn="ctr"/>
+            <a:r>
+              <a:rPr lang="en-GB" dirty="0">
+                <a:solidFill>
+                  <a:schemeClr val="tx1"/>
+                </a:solidFill>
+              </a:rPr>
+              <a:t>Storage account with </a:t>
+            </a:r>
+            <a:r>
+              <a:rPr lang="en-GB" b="1" dirty="0">
+                <a:solidFill>
+                  <a:schemeClr val="tx1"/>
+                </a:solidFill>
+              </a:rPr>
+              <a:t>Static site hosting</a:t>
+            </a:r>
+            <a:r>
+              <a:rPr lang="en-GB" dirty="0">
+                <a:solidFill>
+                  <a:schemeClr val="tx1"/>
+                </a:solidFill>
+              </a:rPr>
+              <a:t> enabled</a:t>
+            </a:r>
+          </a:p>
+        </p:txBody>
+      </p:sp>
+    </p:spTree>
+    <p:extLst>
+      <p:ext uri="{BB962C8B-B14F-4D97-AF65-F5344CB8AC3E}">
+        <p14:creationId xmlns:p14="http://schemas.microsoft.com/office/powerpoint/2010/main" val="2614157745"/>
+      </p:ext>
+    </p:extLst>
+  </p:cSld>
+  <p:clrMapOvr>
+    <a:masterClrMapping/>
+  </p:clrMapOvr>
+</p:sld>
+</file>
+
 <file path=ppt/slides/slide2.xml><?xml version="1.0" encoding="utf-8"?>
 <p:sld xmlns:a="http://schemas.openxmlformats.org/drawingml/2006/main" xmlns:r="http://schemas.openxmlformats.org/officeDocument/2006/relationships" xmlns:p="http://schemas.openxmlformats.org/presentationml/2006/main">
   <p:cSld>

</xml_diff>

<commit_message>
Added pictorial explanation of Tasks in the CD stage
</commit_message>
<xml_diff>
--- a/DemoWebAppWithCiCd/docs/cicd.pptx
+++ b/DemoWebAppWithCiCd/docs/cicd.pptx
@@ -18,6 +18,7 @@
     <p:sldId id="266" r:id="rId12"/>
     <p:sldId id="267" r:id="rId13"/>
     <p:sldId id="268" r:id="rId14"/>
+    <p:sldId id="269" r:id="rId15"/>
   </p:sldIdLst>
   <p:sldSz cx="12192000" cy="6858000"/>
   <p:notesSz cx="6858000" cy="9144000"/>
@@ -4182,6 +4183,456 @@
 </p:sld>
 </file>
 
+<file path=ppt/slides/slide14.xml><?xml version="1.0" encoding="utf-8"?>
+<p:sld xmlns:a="http://schemas.openxmlformats.org/drawingml/2006/main" xmlns:r="http://schemas.openxmlformats.org/officeDocument/2006/relationships" xmlns:p="http://schemas.openxmlformats.org/presentationml/2006/main">
+  <p:cSld>
+    <p:spTree>
+      <p:nvGrpSpPr>
+        <p:cNvPr id="1" name=""/>
+        <p:cNvGrpSpPr/>
+        <p:nvPr/>
+      </p:nvGrpSpPr>
+      <p:grpSpPr>
+        <a:xfrm>
+          <a:off x="0" y="0"/>
+          <a:ext cx="0" cy="0"/>
+          <a:chOff x="0" y="0"/>
+          <a:chExt cx="0" cy="0"/>
+        </a:xfrm>
+      </p:grpSpPr>
+      <p:pic>
+        <p:nvPicPr>
+          <p:cNvPr id="3" name="Picture 2">
+            <a:extLst>
+              <a:ext uri="{FF2B5EF4-FFF2-40B4-BE49-F238E27FC236}">
+                <a16:creationId xmlns:a16="http://schemas.microsoft.com/office/drawing/2014/main" id="{0CABB596-1CED-4B75-99A3-BA99E628913F}"/>
+              </a:ext>
+            </a:extLst>
+          </p:cNvPr>
+          <p:cNvPicPr>
+            <a:picLocks noChangeAspect="1"/>
+          </p:cNvPicPr>
+          <p:nvPr/>
+        </p:nvPicPr>
+        <p:blipFill>
+          <a:blip r:embed="rId2">
+            <a:extLst>
+              <a:ext uri="{28A0092B-C50C-407E-A947-70E740481C1C}">
+                <a14:useLocalDpi xmlns:a14="http://schemas.microsoft.com/office/drawing/2010/main" val="0"/>
+              </a:ext>
+            </a:extLst>
+          </a:blip>
+          <a:stretch>
+            <a:fillRect/>
+          </a:stretch>
+        </p:blipFill>
+        <p:spPr>
+          <a:xfrm>
+            <a:off x="498581" y="866358"/>
+            <a:ext cx="4953429" cy="3581710"/>
+          </a:xfrm>
+          <a:prstGeom prst="rect">
+            <a:avLst/>
+          </a:prstGeom>
+        </p:spPr>
+      </p:pic>
+      <p:sp>
+        <p:nvSpPr>
+          <p:cNvPr id="4" name="Callout: Line 3">
+            <a:extLst>
+              <a:ext uri="{FF2B5EF4-FFF2-40B4-BE49-F238E27FC236}">
+                <a16:creationId xmlns:a16="http://schemas.microsoft.com/office/drawing/2014/main" id="{3160CDF9-38AE-4EBC-B545-51B1771FB842}"/>
+              </a:ext>
+            </a:extLst>
+          </p:cNvPr>
+          <p:cNvSpPr/>
+          <p:nvPr/>
+        </p:nvSpPr>
+        <p:spPr>
+          <a:xfrm>
+            <a:off x="7174182" y="476270"/>
+            <a:ext cx="4411012" cy="780176"/>
+          </a:xfrm>
+          <a:prstGeom prst="borderCallout1">
+            <a:avLst>
+              <a:gd name="adj1" fmla="val 47782"/>
+              <a:gd name="adj2" fmla="val -29"/>
+              <a:gd name="adj3" fmla="val 287899"/>
+              <a:gd name="adj4" fmla="val -123363"/>
+            </a:avLst>
+          </a:prstGeom>
+          <a:solidFill>
+            <a:schemeClr val="accent4">
+              <a:lumMod val="40000"/>
+              <a:lumOff val="60000"/>
+            </a:schemeClr>
+          </a:solidFill>
+        </p:spPr>
+        <p:style>
+          <a:lnRef idx="2">
+            <a:schemeClr val="accent1">
+              <a:shade val="50000"/>
+            </a:schemeClr>
+          </a:lnRef>
+          <a:fillRef idx="1">
+            <a:schemeClr val="accent1"/>
+          </a:fillRef>
+          <a:effectRef idx="0">
+            <a:schemeClr val="accent1"/>
+          </a:effectRef>
+          <a:fontRef idx="minor">
+            <a:schemeClr val="lt1"/>
+          </a:fontRef>
+        </p:style>
+        <p:txBody>
+          <a:bodyPr rtlCol="0" anchor="ctr"/>
+          <a:lstStyle/>
+          <a:p>
+            <a:pPr algn="ctr"/>
+            <a:r>
+              <a:rPr lang="en-GB" dirty="0">
+                <a:solidFill>
+                  <a:schemeClr val="tx1"/>
+                </a:solidFill>
+              </a:rPr>
+              <a:t>We are exporting the </a:t>
+            </a:r>
+            <a:r>
+              <a:rPr lang="en-GB" b="1" dirty="0">
+                <a:solidFill>
+                  <a:schemeClr val="tx1"/>
+                </a:solidFill>
+              </a:rPr>
+              <a:t>service principal id</a:t>
+            </a:r>
+            <a:r>
+              <a:rPr lang="en-GB" dirty="0">
+                <a:solidFill>
+                  <a:schemeClr val="tx1"/>
+                </a:solidFill>
+              </a:rPr>
+              <a:t>, </a:t>
+            </a:r>
+            <a:r>
+              <a:rPr lang="en-GB" b="1" dirty="0">
+                <a:solidFill>
+                  <a:schemeClr val="tx1"/>
+                </a:solidFill>
+              </a:rPr>
+              <a:t>principal key</a:t>
+            </a:r>
+            <a:r>
+              <a:rPr lang="en-GB" dirty="0">
+                <a:solidFill>
+                  <a:schemeClr val="tx1"/>
+                </a:solidFill>
+              </a:rPr>
+              <a:t> and </a:t>
+            </a:r>
+            <a:r>
+              <a:rPr lang="en-GB" b="1" dirty="0">
+                <a:solidFill>
+                  <a:schemeClr val="tx1"/>
+                </a:solidFill>
+              </a:rPr>
+              <a:t>tenant id</a:t>
+            </a:r>
+            <a:r>
+              <a:rPr lang="en-GB" dirty="0">
+                <a:solidFill>
+                  <a:schemeClr val="tx1"/>
+                </a:solidFill>
+              </a:rPr>
+              <a:t> as environment variables</a:t>
+            </a:r>
+          </a:p>
+        </p:txBody>
+      </p:sp>
+      <p:sp>
+        <p:nvSpPr>
+          <p:cNvPr id="5" name="Callout: Line 4">
+            <a:extLst>
+              <a:ext uri="{FF2B5EF4-FFF2-40B4-BE49-F238E27FC236}">
+                <a16:creationId xmlns:a16="http://schemas.microsoft.com/office/drawing/2014/main" id="{C37EF6F3-0730-49A6-AEF7-76965E873757}"/>
+              </a:ext>
+            </a:extLst>
+          </p:cNvPr>
+          <p:cNvSpPr/>
+          <p:nvPr/>
+        </p:nvSpPr>
+        <p:spPr>
+          <a:xfrm>
+            <a:off x="7174182" y="1375689"/>
+            <a:ext cx="4411012" cy="1090673"/>
+          </a:xfrm>
+          <a:prstGeom prst="borderCallout1">
+            <a:avLst>
+              <a:gd name="adj1" fmla="val 47782"/>
+              <a:gd name="adj2" fmla="val -29"/>
+              <a:gd name="adj3" fmla="val 166904"/>
+              <a:gd name="adj4" fmla="val -131541"/>
+            </a:avLst>
+          </a:prstGeom>
+          <a:solidFill>
+            <a:schemeClr val="accent4">
+              <a:lumMod val="40000"/>
+              <a:lumOff val="60000"/>
+            </a:schemeClr>
+          </a:solidFill>
+        </p:spPr>
+        <p:style>
+          <a:lnRef idx="2">
+            <a:schemeClr val="accent1">
+              <a:shade val="50000"/>
+            </a:schemeClr>
+          </a:lnRef>
+          <a:fillRef idx="1">
+            <a:schemeClr val="accent1"/>
+          </a:fillRef>
+          <a:effectRef idx="0">
+            <a:schemeClr val="accent1"/>
+          </a:effectRef>
+          <a:fontRef idx="minor">
+            <a:schemeClr val="lt1"/>
+          </a:fontRef>
+        </p:style>
+        <p:txBody>
+          <a:bodyPr rtlCol="0" anchor="ctr"/>
+          <a:lstStyle/>
+          <a:p>
+            <a:pPr algn="ctr"/>
+            <a:r>
+              <a:rPr lang="en-GB" dirty="0">
+                <a:solidFill>
+                  <a:schemeClr val="tx1"/>
+                </a:solidFill>
+              </a:rPr>
+              <a:t>We are doing an </a:t>
+            </a:r>
+            <a:r>
+              <a:rPr lang="en-GB" b="1" dirty="0">
+                <a:solidFill>
+                  <a:schemeClr val="tx1"/>
+                </a:solidFill>
+              </a:rPr>
+              <a:t>AZ LOGIN</a:t>
+            </a:r>
+            <a:r>
+              <a:rPr lang="en-GB" dirty="0">
+                <a:solidFill>
+                  <a:schemeClr val="tx1"/>
+                </a:solidFill>
+              </a:rPr>
+              <a:t> with the environment variables from the previous step. This allows using </a:t>
+            </a:r>
+            <a:r>
+              <a:rPr lang="en-GB" b="1" dirty="0">
+                <a:solidFill>
+                  <a:schemeClr val="tx1"/>
+                </a:solidFill>
+              </a:rPr>
+              <a:t>CLI</a:t>
+            </a:r>
+            <a:r>
+              <a:rPr lang="en-GB" dirty="0">
+                <a:solidFill>
+                  <a:schemeClr val="tx1"/>
+                </a:solidFill>
+              </a:rPr>
+              <a:t> and </a:t>
+            </a:r>
+            <a:r>
+              <a:rPr lang="en-GB" b="1" dirty="0">
+                <a:solidFill>
+                  <a:schemeClr val="tx1"/>
+                </a:solidFill>
+              </a:rPr>
+              <a:t>PowerShell</a:t>
+            </a:r>
+            <a:r>
+              <a:rPr lang="en-GB" dirty="0">
+                <a:solidFill>
+                  <a:schemeClr val="tx1"/>
+                </a:solidFill>
+              </a:rPr>
+              <a:t> from the same script</a:t>
+            </a:r>
+          </a:p>
+        </p:txBody>
+      </p:sp>
+      <p:sp>
+        <p:nvSpPr>
+          <p:cNvPr id="6" name="Callout: Line 5">
+            <a:extLst>
+              <a:ext uri="{FF2B5EF4-FFF2-40B4-BE49-F238E27FC236}">
+                <a16:creationId xmlns:a16="http://schemas.microsoft.com/office/drawing/2014/main" id="{9F6FDAF5-E576-499B-9556-1264EDAB73DD}"/>
+              </a:ext>
+            </a:extLst>
+          </p:cNvPr>
+          <p:cNvSpPr/>
+          <p:nvPr/>
+        </p:nvSpPr>
+        <p:spPr>
+          <a:xfrm>
+            <a:off x="7174182" y="2657213"/>
+            <a:ext cx="4411012" cy="1090673"/>
+          </a:xfrm>
+          <a:prstGeom prst="borderCallout1">
+            <a:avLst>
+              <a:gd name="adj1" fmla="val 47782"/>
+              <a:gd name="adj2" fmla="val -29"/>
+              <a:gd name="adj3" fmla="val 81528"/>
+              <a:gd name="adj4" fmla="val -134584"/>
+            </a:avLst>
+          </a:prstGeom>
+          <a:solidFill>
+            <a:schemeClr val="accent4">
+              <a:lumMod val="40000"/>
+              <a:lumOff val="60000"/>
+            </a:schemeClr>
+          </a:solidFill>
+        </p:spPr>
+        <p:style>
+          <a:lnRef idx="2">
+            <a:schemeClr val="accent1">
+              <a:shade val="50000"/>
+            </a:schemeClr>
+          </a:lnRef>
+          <a:fillRef idx="1">
+            <a:schemeClr val="accent1"/>
+          </a:fillRef>
+          <a:effectRef idx="0">
+            <a:schemeClr val="accent1"/>
+          </a:effectRef>
+          <a:fontRef idx="minor">
+            <a:schemeClr val="lt1"/>
+          </a:fontRef>
+        </p:style>
+        <p:txBody>
+          <a:bodyPr rtlCol="0" anchor="ctr"/>
+          <a:lstStyle/>
+          <a:p>
+            <a:pPr algn="ctr"/>
+            <a:r>
+              <a:rPr lang="en-GB" dirty="0">
+                <a:solidFill>
+                  <a:schemeClr val="tx1"/>
+                </a:solidFill>
+              </a:rPr>
+              <a:t>We are executing the PowerShell script </a:t>
+            </a:r>
+            <a:r>
+              <a:rPr lang="en-GB" b="1" dirty="0" err="1">
+                <a:solidFill>
+                  <a:schemeClr val="tx1"/>
+                </a:solidFill>
+              </a:rPr>
+              <a:t>BackEnd</a:t>
+            </a:r>
+            <a:r>
+              <a:rPr lang="en-GB" b="1" dirty="0">
+                <a:solidFill>
+                  <a:schemeClr val="tx1"/>
+                </a:solidFill>
+              </a:rPr>
+              <a:t>/infrastructure/createwebapp.ps1</a:t>
+            </a:r>
+          </a:p>
+        </p:txBody>
+      </p:sp>
+      <p:sp>
+        <p:nvSpPr>
+          <p:cNvPr id="7" name="Callout: Line 6">
+            <a:extLst>
+              <a:ext uri="{FF2B5EF4-FFF2-40B4-BE49-F238E27FC236}">
+                <a16:creationId xmlns:a16="http://schemas.microsoft.com/office/drawing/2014/main" id="{5E5B06FD-275A-4CD5-ACC3-08B80943BE62}"/>
+              </a:ext>
+            </a:extLst>
+          </p:cNvPr>
+          <p:cNvSpPr/>
+          <p:nvPr/>
+        </p:nvSpPr>
+        <p:spPr>
+          <a:xfrm>
+            <a:off x="7174182" y="3938737"/>
+            <a:ext cx="4411012" cy="1090673"/>
+          </a:xfrm>
+          <a:prstGeom prst="borderCallout1">
+            <a:avLst>
+              <a:gd name="adj1" fmla="val 47782"/>
+              <a:gd name="adj2" fmla="val -29"/>
+              <a:gd name="adj3" fmla="val 6151"/>
+              <a:gd name="adj4" fmla="val -133443"/>
+            </a:avLst>
+          </a:prstGeom>
+          <a:solidFill>
+            <a:schemeClr val="accent4">
+              <a:lumMod val="40000"/>
+              <a:lumOff val="60000"/>
+            </a:schemeClr>
+          </a:solidFill>
+        </p:spPr>
+        <p:style>
+          <a:lnRef idx="2">
+            <a:schemeClr val="accent1">
+              <a:shade val="50000"/>
+            </a:schemeClr>
+          </a:lnRef>
+          <a:fillRef idx="1">
+            <a:schemeClr val="accent1"/>
+          </a:fillRef>
+          <a:effectRef idx="0">
+            <a:schemeClr val="accent1"/>
+          </a:effectRef>
+          <a:fontRef idx="minor">
+            <a:schemeClr val="lt1"/>
+          </a:fontRef>
+        </p:style>
+        <p:txBody>
+          <a:bodyPr rtlCol="0" anchor="ctr"/>
+          <a:lstStyle/>
+          <a:p>
+            <a:pPr algn="ctr"/>
+            <a:r>
+              <a:rPr lang="en-GB" dirty="0">
+                <a:solidFill>
+                  <a:schemeClr val="tx1"/>
+                </a:solidFill>
+              </a:rPr>
+              <a:t>We are executing the PowerShell script </a:t>
+            </a:r>
+            <a:r>
+              <a:rPr lang="en-GB" b="1" dirty="0" err="1">
+                <a:solidFill>
+                  <a:schemeClr val="tx1"/>
+                </a:solidFill>
+              </a:rPr>
+              <a:t>BackEnd</a:t>
+            </a:r>
+            <a:r>
+              <a:rPr lang="en-GB" b="1" dirty="0">
+                <a:solidFill>
+                  <a:schemeClr val="tx1"/>
+                </a:solidFill>
+              </a:rPr>
+              <a:t>/infrastructure/deploy.ps1</a:t>
+            </a:r>
+          </a:p>
+        </p:txBody>
+      </p:sp>
+    </p:spTree>
+    <p:extLst>
+      <p:ext uri="{BB962C8B-B14F-4D97-AF65-F5344CB8AC3E}">
+        <p14:creationId xmlns:p14="http://schemas.microsoft.com/office/powerpoint/2010/main" val="4015319650"/>
+      </p:ext>
+    </p:extLst>
+  </p:cSld>
+  <p:clrMapOvr>
+    <a:masterClrMapping/>
+  </p:clrMapOvr>
+</p:sld>
+</file>
+
 <file path=ppt/slides/slide2.xml><?xml version="1.0" encoding="utf-8"?>
 <p:sld xmlns:a="http://schemas.openxmlformats.org/drawingml/2006/main" xmlns:r="http://schemas.openxmlformats.org/officeDocument/2006/relationships" xmlns:p="http://schemas.openxmlformats.org/presentationml/2006/main">
   <p:cSld>

</xml_diff>

<commit_message>
Completed "Getting started with the accompanying code"
</commit_message>
<xml_diff>
--- a/DemoWebAppWithCiCd/docs/cicd.pptx
+++ b/DemoWebAppWithCiCd/docs/cicd.pptx
@@ -4363,14 +4363,14 @@
         <p:spPr>
           <a:xfrm>
             <a:off x="7174182" y="1375689"/>
-            <a:ext cx="4411012" cy="1090673"/>
+            <a:ext cx="4411012" cy="1281524"/>
           </a:xfrm>
           <a:prstGeom prst="borderCallout1">
             <a:avLst>
               <a:gd name="adj1" fmla="val 47782"/>
               <a:gd name="adj2" fmla="val -29"/>
-              <a:gd name="adj3" fmla="val 166904"/>
-              <a:gd name="adj4" fmla="val -131541"/>
+              <a:gd name="adj3" fmla="val 142683"/>
+              <a:gd name="adj4" fmla="val -129259"/>
             </a:avLst>
           </a:prstGeom>
           <a:solidFill>
@@ -4455,7 +4455,23 @@
                   <a:schemeClr val="tx1"/>
                 </a:solidFill>
               </a:rPr>
-              <a:t> from the same script</a:t>
+              <a:t> from the same script in subsequent </a:t>
+            </a:r>
+            <a:r>
+              <a:rPr lang="en-GB" b="1" dirty="0">
+                <a:solidFill>
+                  <a:schemeClr val="tx1"/>
+                </a:solidFill>
+              </a:rPr>
+              <a:t>Azure PowerShell</a:t>
+            </a:r>
+            <a:r>
+              <a:rPr lang="en-GB" dirty="0">
+                <a:solidFill>
+                  <a:schemeClr val="tx1"/>
+                </a:solidFill>
+              </a:rPr>
+              <a:t> tasks</a:t>
             </a:r>
           </a:p>
         </p:txBody>
@@ -4474,15 +4490,15 @@
         </p:nvSpPr>
         <p:spPr>
           <a:xfrm>
-            <a:off x="7174182" y="2657213"/>
+            <a:off x="7174182" y="2783048"/>
             <a:ext cx="4411012" cy="1090673"/>
           </a:xfrm>
           <a:prstGeom prst="borderCallout1">
             <a:avLst>
               <a:gd name="adj1" fmla="val 47782"/>
               <a:gd name="adj2" fmla="val -29"/>
-              <a:gd name="adj3" fmla="val 81528"/>
-              <a:gd name="adj4" fmla="val -134584"/>
+              <a:gd name="adj3" fmla="val 73067"/>
+              <a:gd name="adj4" fmla="val -131351"/>
             </a:avLst>
           </a:prstGeom>
           <a:solidFill>
@@ -4554,7 +4570,7 @@
         </p:nvSpPr>
         <p:spPr>
           <a:xfrm>
-            <a:off x="7174182" y="3938737"/>
+            <a:off x="7174182" y="4022627"/>
             <a:ext cx="4411012" cy="1090673"/>
           </a:xfrm>
           <a:prstGeom prst="borderCallout1">

</xml_diff>